<commit_message>
Fixes and TODOs on stack and queue basics slides
</commit_message>
<xml_diff>
--- a/Courses/Software-Sciences/Module-2-DS-and-Algo/03.1-Stack-and-Queue-Basics/03.1-Stack-and-Queue-Basics.pptx
+++ b/Courses/Software-Sciences/Module-2-DS-and-Algo/03.1-Stack-and-Queue-Basics/03.1-Stack-and-Queue-Basics.pptx
@@ -154,7 +154,7 @@
             <p14:sldId id="257"/>
           </p14:sldIdLst>
         </p14:section>
-        <p14:section name="Линейни структури от данни" id="{B4313D5A-4860-41C6-9ED1-ED09D2CBF358}">
+        <p14:section name="Структури от данни" id="{B4313D5A-4860-41C6-9ED1-ED09D2CBF358}">
           <p14:sldIdLst>
             <p14:sldId id="730"/>
             <p14:sldId id="728"/>
@@ -163,7 +163,7 @@
             <p14:sldId id="729"/>
           </p14:sldIdLst>
         </p14:section>
-        <p14:section name="Стекове" id="{4C0A2BF5-49EF-49B2-A251-E79272C1AAE0}">
+        <p14:section name="Стек" id="{4C0A2BF5-49EF-49B2-A251-E79272C1AAE0}">
           <p14:sldIdLst>
             <p14:sldId id="259"/>
             <p14:sldId id="260"/>
@@ -331,7 +331,7 @@
           <a:p>
             <a:fld id="{4E087215-0C8F-4762-A664-737A353EC9A4}" type="datetimeFigureOut">
               <a:rPr lang="bg-BG" smtClean="0"/>
-              <a:t>6.7.2023 г.</a:t>
+              <a:t>18.08.23 г.</a:t>
             </a:fld>
             <a:endParaRPr lang="bg-BG" dirty="0"/>
           </a:p>
@@ -522,7 +522,7 @@
           <a:p>
             <a:fld id="{72D84649-876A-46C9-8472-14CB09C070D8}" type="datetimeFigureOut">
               <a:rPr lang="en-US" smtClean="0"/>
-              <a:t>7/6/2023</a:t>
+              <a:t>8/18/23</a:t>
             </a:fld>
             <a:endParaRPr lang="en-US" dirty="0"/>
           </a:p>
@@ -1229,540 +1229,6 @@
           <a:bodyPr/>
           <a:lstStyle/>
           <a:p>
-            <a:pPr>
-              <a:lnSpc>
-                <a:spcPct val="100000"/>
-              </a:lnSpc>
-            </a:pPr>
-            <a:r>
-              <a:rPr lang="en-US" sz="1200" b="1" dirty="0"/>
-              <a:t>Data structures </a:t>
-            </a:r>
-            <a:r>
-              <a:rPr lang="en-US" sz="1200" dirty="0"/>
-              <a:t>are representations of data in the computer memory, which allow efficient access and modification.</a:t>
-            </a:r>
-          </a:p>
-          <a:p>
-            <a:pPr marL="171450" indent="-171450">
-              <a:lnSpc>
-                <a:spcPct val="100000"/>
-              </a:lnSpc>
-              <a:buFont typeface="Arial" panose="020B0604020202020204" pitchFamily="34" charset="0"/>
-              <a:buChar char="•"/>
-            </a:pPr>
-            <a:r>
-              <a:rPr lang="en-US" sz="1200" dirty="0"/>
-              <a:t>This is a pretty </a:t>
-            </a:r>
-            <a:r>
-              <a:rPr lang="en-US" sz="1200" b="1" dirty="0"/>
-              <a:t>big topic</a:t>
-            </a:r>
-            <a:r>
-              <a:rPr lang="en-US" sz="1200" dirty="0"/>
-              <a:t>.</a:t>
-            </a:r>
-          </a:p>
-          <a:p>
-            <a:pPr marL="171450" indent="-171450">
-              <a:lnSpc>
-                <a:spcPct val="100000"/>
-              </a:lnSpc>
-              <a:buFont typeface="Arial" panose="020B0604020202020204" pitchFamily="34" charset="0"/>
-              <a:buChar char="•"/>
-            </a:pPr>
-            <a:r>
-              <a:rPr lang="en-US" sz="1200" b="1" dirty="0"/>
-              <a:t>Hundreds of books </a:t>
-            </a:r>
-            <a:r>
-              <a:rPr lang="en-US" sz="1200" dirty="0"/>
-              <a:t>are written about data structures.</a:t>
-            </a:r>
-          </a:p>
-          <a:p>
-            <a:pPr marL="171450" indent="-171450">
-              <a:lnSpc>
-                <a:spcPct val="100000"/>
-              </a:lnSpc>
-              <a:buFont typeface="Arial" panose="020B0604020202020204" pitchFamily="34" charset="0"/>
-              <a:buChar char="•"/>
-            </a:pPr>
-            <a:r>
-              <a:rPr lang="en-US" sz="1200" dirty="0"/>
-              <a:t>Data structures can be </a:t>
-            </a:r>
-            <a:r>
-              <a:rPr lang="en-US" sz="1200" b="1" dirty="0"/>
-              <a:t>linear structures</a:t>
-            </a:r>
-            <a:r>
-              <a:rPr lang="en-US" sz="1200" dirty="0"/>
-              <a:t> (such as arrays and lists), </a:t>
-            </a:r>
-            <a:r>
-              <a:rPr lang="en-US" sz="1200" b="1" dirty="0"/>
-              <a:t>tree-like structures </a:t>
-            </a:r>
-            <a:r>
-              <a:rPr lang="en-US" sz="1200" dirty="0"/>
-              <a:t>(such</a:t>
-            </a:r>
-            <a:r>
-              <a:rPr lang="bg-BG" sz="1200" dirty="0"/>
-              <a:t> </a:t>
-            </a:r>
-            <a:r>
-              <a:rPr lang="en-US" sz="1200" dirty="0"/>
-              <a:t>as balanced trees), </a:t>
-            </a:r>
-            <a:r>
-              <a:rPr lang="en-US" sz="1200" b="1" dirty="0"/>
-              <a:t>graph-like structures </a:t>
-            </a:r>
-            <a:r>
-              <a:rPr lang="en-US" sz="1200" dirty="0"/>
-              <a:t>(such as graphs), </a:t>
-            </a:r>
-            <a:r>
-              <a:rPr lang="en-US" sz="1200" b="1" dirty="0"/>
-              <a:t>hash-based structures </a:t>
-            </a:r>
-            <a:r>
-              <a:rPr lang="en-US" sz="1200" dirty="0"/>
-              <a:t>(such as hash-tables) and others.</a:t>
-            </a:r>
-          </a:p>
-          <a:p>
-            <a:pPr>
-              <a:lnSpc>
-                <a:spcPct val="100000"/>
-              </a:lnSpc>
-            </a:pPr>
-            <a:endParaRPr lang="en-US" sz="1200" dirty="0"/>
-          </a:p>
-          <a:p>
-            <a:pPr>
-              <a:lnSpc>
-                <a:spcPct val="100000"/>
-              </a:lnSpc>
-            </a:pPr>
-            <a:r>
-              <a:rPr lang="en-US" sz="1200" b="1" dirty="0"/>
-              <a:t>Linear data types</a:t>
-            </a:r>
-            <a:r>
-              <a:rPr lang="en-US" sz="1200" dirty="0"/>
-              <a:t> are the most commonly used data structures in programming.</a:t>
-            </a:r>
-          </a:p>
-          <a:p>
-            <a:pPr marL="171450" indent="-171450">
-              <a:lnSpc>
-                <a:spcPct val="100000"/>
-              </a:lnSpc>
-              <a:buFont typeface="Arial" panose="020B0604020202020204" pitchFamily="34" charset="0"/>
-              <a:buChar char="•"/>
-            </a:pPr>
-            <a:r>
-              <a:rPr lang="en-US" sz="1200" dirty="0"/>
-              <a:t>They represent </a:t>
-            </a:r>
-            <a:r>
-              <a:rPr lang="en-US" sz="1200" b="1" dirty="0"/>
-              <a:t>sequences of elements</a:t>
-            </a:r>
-            <a:r>
-              <a:rPr lang="en-US" sz="1200" dirty="0"/>
-              <a:t>, which can be ordered or not, indexed or not, linked to the next element or not, etc</a:t>
-            </a:r>
-            <a:r>
-              <a:rPr lang="bg-BG" sz="1200" dirty="0"/>
-              <a:t>.</a:t>
-            </a:r>
-          </a:p>
-          <a:p>
-            <a:pPr marL="171450" indent="-171450">
-              <a:lnSpc>
-                <a:spcPct val="100000"/>
-              </a:lnSpc>
-              <a:buFont typeface="Arial" panose="020B0604020202020204" pitchFamily="34" charset="0"/>
-              <a:buChar char="•"/>
-            </a:pPr>
-            <a:r>
-              <a:rPr lang="en-US" sz="1200" dirty="0"/>
-              <a:t>Examples of linear data structures are </a:t>
-            </a:r>
-            <a:r>
-              <a:rPr lang="en-US" sz="1200" b="1" dirty="0"/>
-              <a:t>arrays</a:t>
-            </a:r>
-            <a:r>
-              <a:rPr lang="en-US" sz="1200" dirty="0"/>
-              <a:t>, </a:t>
-            </a:r>
-            <a:r>
-              <a:rPr lang="en-US" sz="1200" b="1" dirty="0"/>
-              <a:t>lists</a:t>
-            </a:r>
-            <a:r>
-              <a:rPr lang="en-US" sz="1200" dirty="0"/>
-              <a:t>, </a:t>
-            </a:r>
-            <a:r>
-              <a:rPr lang="en-US" sz="1200" b="1" dirty="0"/>
-              <a:t>stacks</a:t>
-            </a:r>
-            <a:r>
-              <a:rPr lang="bg-BG" sz="1200" dirty="0"/>
-              <a:t> </a:t>
-            </a:r>
-            <a:r>
-              <a:rPr lang="en-US" sz="1200" dirty="0"/>
-              <a:t>and</a:t>
-            </a:r>
-            <a:r>
-              <a:rPr lang="bg-BG" sz="1200" dirty="0"/>
-              <a:t> </a:t>
-            </a:r>
-            <a:r>
-              <a:rPr lang="en-US" sz="1200" b="1" dirty="0"/>
-              <a:t>queues</a:t>
-            </a:r>
-            <a:r>
-              <a:rPr lang="en-US" sz="1200" dirty="0"/>
-              <a:t>.</a:t>
-            </a:r>
-          </a:p>
-          <a:p>
-            <a:endParaRPr lang="en-US" dirty="0"/>
-          </a:p>
-          <a:p>
-            <a:r>
-              <a:rPr lang="en-US" dirty="0"/>
-              <a:t>This is how </a:t>
-            </a:r>
-            <a:r>
-              <a:rPr lang="en-US" b="1" dirty="0"/>
-              <a:t>arrays</a:t>
-            </a:r>
-            <a:r>
-              <a:rPr lang="en-US" dirty="0"/>
-              <a:t> and </a:t>
-            </a:r>
-            <a:r>
-              <a:rPr lang="en-US" b="1" dirty="0"/>
-              <a:t>array-based lists </a:t>
-            </a:r>
-            <a:r>
-              <a:rPr lang="en-US" dirty="0"/>
-              <a:t>look like in most programming languages and platforms:</a:t>
-            </a:r>
-          </a:p>
-          <a:p>
-            <a:pPr marL="171450" indent="-171450">
-              <a:buFont typeface="Arial" panose="020B0604020202020204" pitchFamily="34" charset="0"/>
-              <a:buChar char="•"/>
-            </a:pPr>
-            <a:r>
-              <a:rPr lang="en-US" dirty="0"/>
-              <a:t>They are </a:t>
-            </a:r>
-            <a:r>
-              <a:rPr lang="en-US" b="1" dirty="0"/>
-              <a:t>sequences of elements</a:t>
-            </a:r>
-            <a:r>
-              <a:rPr lang="en-US" dirty="0"/>
-              <a:t>, which are directly accessible by their </a:t>
-            </a:r>
-            <a:r>
-              <a:rPr lang="en-US" b="1" dirty="0"/>
-              <a:t>position</a:t>
-            </a:r>
-            <a:r>
-              <a:rPr lang="en-US" dirty="0"/>
-              <a:t> (which is called "</a:t>
-            </a:r>
-            <a:r>
-              <a:rPr lang="en-US" b="1" dirty="0"/>
-              <a:t>index</a:t>
-            </a:r>
-            <a:r>
-              <a:rPr lang="en-US" dirty="0"/>
-              <a:t>").</a:t>
-            </a:r>
-          </a:p>
-          <a:p>
-            <a:pPr marL="0" indent="0">
-              <a:buFont typeface="Arial" panose="020B0604020202020204" pitchFamily="34" charset="0"/>
-              <a:buNone/>
-            </a:pPr>
-            <a:endParaRPr lang="en-US" dirty="0"/>
-          </a:p>
-          <a:p>
-            <a:pPr marL="0" indent="0">
-              <a:buFont typeface="Arial" panose="020B0604020202020204" pitchFamily="34" charset="0"/>
-              <a:buNone/>
-            </a:pPr>
-            <a:r>
-              <a:rPr lang="en-US" dirty="0"/>
-              <a:t>This is an example of </a:t>
-            </a:r>
-            <a:r>
-              <a:rPr lang="en-US" b="1" dirty="0"/>
-              <a:t>linked-list</a:t>
-            </a:r>
-            <a:r>
-              <a:rPr lang="en-US" dirty="0"/>
-              <a:t>.</a:t>
-            </a:r>
-          </a:p>
-          <a:p>
-            <a:pPr marL="171450" indent="-171450">
-              <a:buFont typeface="Arial" panose="020B0604020202020204" pitchFamily="34" charset="0"/>
-              <a:buChar char="•"/>
-            </a:pPr>
-            <a:r>
-              <a:rPr lang="en-US" dirty="0"/>
-              <a:t>It consists of </a:t>
-            </a:r>
-            <a:r>
-              <a:rPr lang="en-US" b="1" dirty="0"/>
-              <a:t>elements</a:t>
-            </a:r>
-            <a:r>
-              <a:rPr lang="en-US" dirty="0"/>
-              <a:t>, where each element knows its </a:t>
-            </a:r>
-            <a:r>
-              <a:rPr lang="en-US" b="1" dirty="0"/>
-              <a:t>next element</a:t>
-            </a:r>
-            <a:r>
-              <a:rPr lang="en-US" dirty="0"/>
-              <a:t>.</a:t>
-            </a:r>
-          </a:p>
-          <a:p>
-            <a:pPr marL="171450" indent="-171450">
-              <a:buFont typeface="Arial" panose="020B0604020202020204" pitchFamily="34" charset="0"/>
-              <a:buChar char="•"/>
-            </a:pPr>
-            <a:r>
-              <a:rPr lang="en-US" dirty="0"/>
-              <a:t>The </a:t>
-            </a:r>
-            <a:r>
-              <a:rPr lang="en-US" b="1" dirty="0"/>
-              <a:t>last element </a:t>
-            </a:r>
-            <a:r>
-              <a:rPr lang="en-US" dirty="0"/>
-              <a:t>has "</a:t>
-            </a:r>
-            <a:r>
-              <a:rPr lang="en-US" b="1" dirty="0"/>
-              <a:t>null</a:t>
-            </a:r>
-            <a:r>
-              <a:rPr lang="en-US" dirty="0"/>
-              <a:t>" (or missing value) as next element.</a:t>
-            </a:r>
-          </a:p>
-          <a:p>
-            <a:pPr marL="171450" indent="-171450">
-              <a:buFont typeface="Arial" panose="020B0604020202020204" pitchFamily="34" charset="0"/>
-              <a:buChar char="•"/>
-            </a:pPr>
-            <a:r>
-              <a:rPr lang="en-US" dirty="0"/>
-              <a:t>Unlike array-based lists, linked list </a:t>
-            </a:r>
-            <a:r>
-              <a:rPr lang="en-US" b="1" dirty="0"/>
-              <a:t>do not provide direct access by index</a:t>
-            </a:r>
-            <a:r>
-              <a:rPr lang="en-US" dirty="0"/>
-              <a:t>.</a:t>
-            </a:r>
-            <a:endParaRPr lang="bg-BG" dirty="0"/>
-          </a:p>
-          <a:p>
-            <a:pPr marL="0" indent="0">
-              <a:buFont typeface="Arial" panose="020B0604020202020204" pitchFamily="34" charset="0"/>
-              <a:buNone/>
-            </a:pPr>
-            <a:endParaRPr lang="bg-BG" dirty="0"/>
-          </a:p>
-          <a:p>
-            <a:pPr marL="0" indent="0">
-              <a:buFont typeface="Arial" panose="020B0604020202020204" pitchFamily="34" charset="0"/>
-              <a:buNone/>
-            </a:pPr>
-            <a:r>
-              <a:rPr lang="en-US" dirty="0"/>
-              <a:t>This is an example of </a:t>
-            </a:r>
-            <a:r>
-              <a:rPr lang="en-US" b="1" dirty="0"/>
-              <a:t>array-based queue</a:t>
-            </a:r>
-            <a:r>
-              <a:rPr lang="en-US" dirty="0"/>
-              <a:t>.</a:t>
-            </a:r>
-          </a:p>
-          <a:p>
-            <a:pPr marL="171450" indent="-171450">
-              <a:buFont typeface="Arial" panose="020B0604020202020204" pitchFamily="34" charset="0"/>
-              <a:buChar char="•"/>
-            </a:pPr>
-            <a:r>
-              <a:rPr lang="en-US" dirty="0"/>
-              <a:t>The "</a:t>
-            </a:r>
-            <a:r>
-              <a:rPr lang="en-US" b="1" dirty="0"/>
-              <a:t>queue</a:t>
-            </a:r>
-            <a:r>
-              <a:rPr lang="en-US" dirty="0"/>
-              <a:t>" data structure works on the principle </a:t>
-            </a:r>
-            <a:r>
-              <a:rPr lang="en-US" b="1" dirty="0"/>
-              <a:t>FIFO</a:t>
-            </a:r>
-            <a:r>
-              <a:rPr lang="en-US" dirty="0"/>
-              <a:t> (first-in first-out).</a:t>
-            </a:r>
-          </a:p>
-          <a:p>
-            <a:pPr marL="171450" indent="-171450">
-              <a:buFont typeface="Arial" panose="020B0604020202020204" pitchFamily="34" charset="0"/>
-              <a:buChar char="•"/>
-            </a:pPr>
-            <a:r>
-              <a:rPr lang="en-US" dirty="0"/>
-              <a:t>Elements are </a:t>
-            </a:r>
-            <a:r>
-              <a:rPr lang="en-US" b="1" dirty="0"/>
-              <a:t>appended</a:t>
-            </a:r>
-            <a:r>
-              <a:rPr lang="en-US" dirty="0"/>
-              <a:t> in the queue at its </a:t>
-            </a:r>
-            <a:r>
-              <a:rPr lang="en-US" b="1" dirty="0"/>
-              <a:t>left end </a:t>
-            </a:r>
-            <a:r>
-              <a:rPr lang="en-US" dirty="0"/>
-              <a:t>(at its back). This operation is called "</a:t>
-            </a:r>
-            <a:r>
-              <a:rPr lang="en-US" b="1" dirty="0"/>
-              <a:t>enqueue</a:t>
-            </a:r>
-            <a:r>
-              <a:rPr lang="en-US" dirty="0"/>
-              <a:t>".</a:t>
-            </a:r>
-          </a:p>
-          <a:p>
-            <a:pPr marL="171450" marR="0" lvl="0" indent="-171450" algn="l" defTabSz="914400" rtl="0" eaLnBrk="1" fontAlgn="auto" latinLnBrk="0" hangingPunct="1">
-              <a:lnSpc>
-                <a:spcPct val="100000"/>
-              </a:lnSpc>
-              <a:spcBef>
-                <a:spcPts val="0"/>
-              </a:spcBef>
-              <a:spcAft>
-                <a:spcPts val="0"/>
-              </a:spcAft>
-              <a:buClrTx/>
-              <a:buSzTx/>
-              <a:buFont typeface="Arial" panose="020B0604020202020204" pitchFamily="34" charset="0"/>
-              <a:buChar char="•"/>
-              <a:tabLst/>
-              <a:defRPr/>
-            </a:pPr>
-            <a:r>
-              <a:rPr lang="en-US" dirty="0"/>
-              <a:t>Elements are </a:t>
-            </a:r>
-            <a:r>
-              <a:rPr lang="en-US" b="1" dirty="0"/>
-              <a:t>taken </a:t>
-            </a:r>
-            <a:r>
-              <a:rPr lang="en-US" dirty="0"/>
-              <a:t>from the queue from its</a:t>
-            </a:r>
-            <a:r>
-              <a:rPr lang="en-US" b="1" dirty="0"/>
-              <a:t> right end </a:t>
-            </a:r>
-            <a:r>
-              <a:rPr lang="en-US" dirty="0"/>
-              <a:t>(from its front). This operation is called "</a:t>
-            </a:r>
-            <a:r>
-              <a:rPr lang="en-US" b="1" dirty="0"/>
-              <a:t>dequeue</a:t>
-            </a:r>
-            <a:r>
-              <a:rPr lang="en-US" dirty="0"/>
-              <a:t>".</a:t>
-            </a:r>
-          </a:p>
-          <a:p>
-            <a:pPr marL="0" indent="0">
-              <a:buFont typeface="Arial" panose="020B0604020202020204" pitchFamily="34" charset="0"/>
-              <a:buNone/>
-            </a:pPr>
-            <a:r>
-              <a:rPr lang="en-US" dirty="0"/>
-              <a:t>We shall </a:t>
-            </a:r>
-            <a:r>
-              <a:rPr lang="en-US" b="1" dirty="0"/>
-              <a:t>master the linear data structures </a:t>
-            </a:r>
-            <a:r>
-              <a:rPr lang="en-US" dirty="0"/>
-              <a:t>in detail in the advanced programming modules at </a:t>
-            </a:r>
-            <a:r>
-              <a:rPr lang="en-US" b="1" dirty="0"/>
-              <a:t>SoftUni</a:t>
-            </a:r>
-            <a:r>
-              <a:rPr lang="en-US" dirty="0"/>
-              <a:t>.</a:t>
-            </a:r>
-          </a:p>
-          <a:p>
-            <a:pPr marL="0" indent="0">
-              <a:buFont typeface="Arial" panose="020B0604020202020204" pitchFamily="34" charset="0"/>
-              <a:buNone/>
-            </a:pPr>
-            <a:endParaRPr lang="en-US" dirty="0"/>
-          </a:p>
-          <a:p>
-            <a:pPr marL="0" indent="0">
-              <a:buFont typeface="Arial" panose="020B0604020202020204" pitchFamily="34" charset="0"/>
-              <a:buNone/>
-            </a:pPr>
-            <a:endParaRPr lang="en-US" dirty="0"/>
-          </a:p>
-          <a:p>
             <a:pPr marL="0" indent="0">
               <a:buFont typeface="Arial" panose="020B0604020202020204" pitchFamily="34" charset="0"/>
               <a:buNone/>
@@ -1900,174 +1366,6 @@
         <p:txBody>
           <a:bodyPr/>
           <a:lstStyle/>
-          <a:p>
-            <a:r>
-              <a:rPr lang="en-US" dirty="0"/>
-              <a:t>This is a simple </a:t>
-            </a:r>
-            <a:r>
-              <a:rPr lang="en-US" b="1" dirty="0"/>
-              <a:t>example</a:t>
-            </a:r>
-            <a:r>
-              <a:rPr lang="en-US" dirty="0"/>
-              <a:t>, which illustrates the </a:t>
-            </a:r>
-            <a:r>
-              <a:rPr lang="en-US" b="1" dirty="0"/>
-              <a:t>"list" data structure</a:t>
-            </a:r>
-            <a:r>
-              <a:rPr lang="en-US" dirty="0"/>
-              <a:t>.</a:t>
-            </a:r>
-          </a:p>
-          <a:p>
-            <a:pPr marL="171450" indent="-171450">
-              <a:lnSpc>
-                <a:spcPct val="90000"/>
-              </a:lnSpc>
-              <a:buFont typeface="Arial" panose="020B0604020202020204" pitchFamily="34" charset="0"/>
-              <a:buChar char="•"/>
-            </a:pPr>
-            <a:r>
-              <a:rPr lang="en-US" b="0" dirty="0"/>
-              <a:t>We have a </a:t>
-            </a:r>
-            <a:r>
-              <a:rPr lang="en-US" b="1" dirty="0"/>
-              <a:t>list of numbers</a:t>
-            </a:r>
-            <a:r>
-              <a:rPr lang="en-US" dirty="0"/>
-              <a:t>, representing a sequence of income amounts.</a:t>
-            </a:r>
-          </a:p>
-          <a:p>
-            <a:pPr marL="0" indent="0">
-              <a:lnSpc>
-                <a:spcPct val="90000"/>
-              </a:lnSpc>
-              <a:buFont typeface="Arial" panose="020B0604020202020204" pitchFamily="34" charset="0"/>
-              <a:buNone/>
-            </a:pPr>
-            <a:endParaRPr lang="en-US" dirty="0"/>
-          </a:p>
-          <a:p>
-            <a:pPr marL="0" indent="0">
-              <a:lnSpc>
-                <a:spcPct val="90000"/>
-              </a:lnSpc>
-              <a:buFont typeface="Arial" panose="020B0604020202020204" pitchFamily="34" charset="0"/>
-              <a:buNone/>
-            </a:pPr>
-            <a:r>
-              <a:rPr lang="en-US" dirty="0"/>
-              <a:t>This is how the list looks like in the memory.</a:t>
-            </a:r>
-          </a:p>
-          <a:p>
-            <a:pPr marL="171450" indent="-171450">
-              <a:lnSpc>
-                <a:spcPct val="90000"/>
-              </a:lnSpc>
-              <a:buFont typeface="Arial" panose="020B0604020202020204" pitchFamily="34" charset="0"/>
-              <a:buChar char="•"/>
-            </a:pPr>
-            <a:r>
-              <a:rPr lang="en-US" dirty="0"/>
-              <a:t>It is an </a:t>
-            </a:r>
-            <a:r>
-              <a:rPr lang="en-US" b="1" dirty="0"/>
-              <a:t>indexed structure</a:t>
-            </a:r>
-            <a:r>
-              <a:rPr lang="en-US" dirty="0"/>
-              <a:t>: each element has a unique </a:t>
-            </a:r>
-            <a:r>
-              <a:rPr lang="en-US" b="1" dirty="0"/>
-              <a:t>index</a:t>
-            </a:r>
-            <a:r>
-              <a:rPr lang="en-US" dirty="0"/>
-              <a:t>, a number in the range from 0 to the size of the list minus one.</a:t>
-            </a:r>
-          </a:p>
-          <a:p>
-            <a:pPr marL="457200" indent="-457200">
-              <a:lnSpc>
-                <a:spcPct val="90000"/>
-              </a:lnSpc>
-              <a:buFont typeface="Wingdings" panose="05000000000000000000" pitchFamily="2" charset="2"/>
-              <a:buChar char="§"/>
-            </a:pPr>
-            <a:endParaRPr lang="en-US" dirty="0"/>
-          </a:p>
-          <a:p>
-            <a:pPr marL="0" indent="0">
-              <a:lnSpc>
-                <a:spcPct val="90000"/>
-              </a:lnSpc>
-              <a:buFont typeface="Wingdings" panose="05000000000000000000" pitchFamily="2" charset="2"/>
-              <a:buNone/>
-            </a:pPr>
-            <a:r>
-              <a:rPr lang="en-US" b="0" dirty="0"/>
-              <a:t>This is how we can </a:t>
-            </a:r>
-            <a:r>
-              <a:rPr lang="en-US" b="1" dirty="0"/>
-              <a:t>append</a:t>
-            </a:r>
-            <a:r>
-              <a:rPr lang="en-US" dirty="0"/>
-              <a:t> a new income.</a:t>
-            </a:r>
-          </a:p>
-          <a:p>
-            <a:pPr marL="0" indent="0">
-              <a:lnSpc>
-                <a:spcPct val="90000"/>
-              </a:lnSpc>
-              <a:buFont typeface="Wingdings" panose="05000000000000000000" pitchFamily="2" charset="2"/>
-              <a:buNone/>
-            </a:pPr>
-            <a:endParaRPr lang="en-US" dirty="0"/>
-          </a:p>
-          <a:p>
-            <a:pPr marL="0" indent="0">
-              <a:lnSpc>
-                <a:spcPct val="90000"/>
-              </a:lnSpc>
-              <a:spcBef>
-                <a:spcPts val="1200"/>
-              </a:spcBef>
-              <a:buFont typeface="Wingdings" panose="05000000000000000000" pitchFamily="2" charset="2"/>
-              <a:buNone/>
-            </a:pPr>
-            <a:r>
-              <a:rPr lang="en-US" b="0" dirty="0"/>
-              <a:t>This is how we can </a:t>
-            </a:r>
-            <a:r>
-              <a:rPr lang="en-US" b="1" dirty="0"/>
-              <a:t>modify</a:t>
-            </a:r>
-            <a:r>
-              <a:rPr lang="en-US" dirty="0"/>
-              <a:t> an existing income, by its </a:t>
-            </a:r>
-            <a:r>
-              <a:rPr lang="en-US" b="1" dirty="0"/>
-              <a:t>index</a:t>
-            </a:r>
-            <a:r>
-              <a:rPr lang="en-US" dirty="0"/>
-              <a:t>.</a:t>
-            </a:r>
-          </a:p>
           <a:p>
             <a:endParaRPr lang="en-US" dirty="0"/>
           </a:p>
@@ -11065,6 +10363,17 @@
               <a:t>Push() –</a:t>
             </a:r>
             <a:r>
+              <a:rPr lang="bg-BG" sz="3750" b="1" kern="1200" dirty="0">
+                <a:solidFill>
+                  <a:schemeClr val="bg2"/>
+                </a:solidFill>
+                <a:latin typeface="+mj-lt"/>
+                <a:ea typeface="+mn-ea"/>
+                <a:cs typeface="Consolas" panose="020B0609020204030204" pitchFamily="49" charset="0"/>
+              </a:rPr>
+              <a:t> </a:t>
+            </a:r>
+            <a:r>
               <a:rPr lang="en-US" sz="3750" b="1" kern="1200" dirty="0">
                 <a:solidFill>
                   <a:schemeClr val="bg2"/>
@@ -14604,7 +13913,15 @@
           <a:p>
             <a:r>
               <a:rPr lang="en-US" sz="3950" dirty="0"/>
-              <a:t>Задача: Обратен низ</a:t>
+              <a:t>Задача: </a:t>
+            </a:r>
+            <a:r>
+              <a:rPr lang="bg-BG" sz="3950" dirty="0"/>
+              <a:t>Обърнат</a:t>
+            </a:r>
+            <a:r>
+              <a:rPr lang="en-US" sz="3950" dirty="0"/>
+              <a:t> низ</a:t>
             </a:r>
             <a:endParaRPr lang="en-US" dirty="0"/>
           </a:p>
@@ -15367,11 +14684,15 @@
               <a:t>Решение: </a:t>
             </a:r>
             <a:r>
+              <a:rPr lang="bg-BG" sz="3950" dirty="0"/>
+              <a:t>Обърнат</a:t>
+            </a:r>
+            <a:r>
               <a:rPr lang="en-US" sz="3950" dirty="0">
                 <a:ea typeface="+mj-lt"/>
                 <a:cs typeface="+mj-lt"/>
               </a:rPr>
-              <a:t>Обратен низ</a:t>
+              <a:t> низ</a:t>
             </a:r>
             <a:endParaRPr lang="en-US" sz="3950" b="0" dirty="0">
               <a:ea typeface="+mj-lt"/>
@@ -15778,7 +15099,21 @@
                 <a:ea typeface="+mn-lt"/>
                 <a:cs typeface="+mn-lt"/>
               </a:rPr>
-              <a:t>Тествайте решението в Judge: </a:t>
+              <a:t>Тествайте решението</a:t>
+            </a:r>
+            <a:r>
+              <a:rPr lang="bg-BG" sz="1750" dirty="0">
+                <a:ea typeface="+mn-lt"/>
+                <a:cs typeface="+mn-lt"/>
+              </a:rPr>
+              <a:t> си</a:t>
+            </a:r>
+            <a:r>
+              <a:rPr lang="en-US" sz="1750" dirty="0">
+                <a:ea typeface="+mn-lt"/>
+                <a:cs typeface="+mn-lt"/>
+              </a:rPr>
+              <a:t> в Judge</a:t>
             </a:r>
             <a:r>
               <a:rPr lang="en-US" sz="1750" dirty="0"/>
@@ -16236,8 +15571,8 @@
         </p:nvSpPr>
         <p:spPr bwMode="auto">
           <a:xfrm>
-            <a:off x="1301890" y="1764726"/>
-            <a:ext cx="9337927" cy="3695023"/>
+            <a:off x="606000" y="1359001"/>
+            <a:ext cx="9962150" cy="4944924"/>
           </a:xfrm>
           <a:prstGeom prst="rect">
             <a:avLst/>
@@ -16280,12 +15615,16 @@
               <a:buSzPct val="70000"/>
             </a:pPr>
             <a:r>
-              <a:rPr lang="en-US" sz="2799" b="1" noProof="1">
+              <a:rPr lang="en-US" sz="3400" b="1" noProof="1">
                 <a:latin typeface="Consolas" pitchFamily="49" charset="0"/>
                 <a:cs typeface="Consolas" pitchFamily="49" charset="0"/>
               </a:rPr>
               <a:t>Stack&lt;int&gt; stack = new Stack&lt;int&gt;();</a:t>
             </a:r>
+            <a:endParaRPr lang="bg-BG" sz="3400" b="1" noProof="1">
+              <a:latin typeface="Consolas" pitchFamily="49" charset="0"/>
+              <a:cs typeface="Consolas" pitchFamily="49" charset="0"/>
+            </a:endParaRPr>
           </a:p>
           <a:p>
             <a:pPr eaLnBrk="0" hangingPunct="0">
@@ -16303,13 +15642,16 @@
               </a:buClr>
               <a:buSzPct val="70000"/>
             </a:pPr>
-            <a:endParaRPr lang="en-US" sz="2799" b="1" noProof="1">
+            <a:endParaRPr lang="en-US" sz="2500" b="1" noProof="1">
               <a:latin typeface="Consolas" pitchFamily="49" charset="0"/>
               <a:cs typeface="Consolas" pitchFamily="49" charset="0"/>
             </a:endParaRPr>
           </a:p>
           <a:p>
             <a:pPr eaLnBrk="0" hangingPunct="0">
+              <a:lnSpc>
+                <a:spcPct val="125000"/>
+              </a:lnSpc>
               <a:spcBef>
                 <a:spcPts val="300"/>
               </a:spcBef>
@@ -16325,7 +15667,7 @@
               <a:buSzPct val="70000"/>
             </a:pPr>
             <a:r>
-              <a:rPr lang="en-US" sz="2799" b="1" noProof="1">
+              <a:rPr lang="en-US" sz="3400" b="1" noProof="1">
                 <a:solidFill>
                   <a:schemeClr val="bg1"/>
                 </a:solidFill>
@@ -16335,14 +15677,14 @@
               <a:t>int</a:t>
             </a:r>
             <a:r>
-              <a:rPr lang="en-US" sz="2799" b="1" noProof="1">
+              <a:rPr lang="en-US" sz="3400" b="1" noProof="1">
                 <a:latin typeface="Consolas" pitchFamily="49" charset="0"/>
                 <a:cs typeface="Consolas" pitchFamily="49" charset="0"/>
               </a:rPr>
               <a:t> count = stack.</a:t>
             </a:r>
             <a:r>
-              <a:rPr lang="en-US" sz="2799" b="1" noProof="1">
+              <a:rPr lang="en-US" sz="3400" b="1" noProof="1">
                 <a:solidFill>
                   <a:schemeClr val="bg1"/>
                 </a:solidFill>
@@ -16352,7 +15694,7 @@
               <a:t>Count</a:t>
             </a:r>
             <a:r>
-              <a:rPr lang="en-US" sz="2799" b="1" noProof="1">
+              <a:rPr lang="en-US" sz="3400" b="1" noProof="1">
                 <a:latin typeface="Consolas" pitchFamily="49" charset="0"/>
                 <a:cs typeface="Consolas" pitchFamily="49" charset="0"/>
               </a:rPr>
@@ -16361,6 +15703,9 @@
           </a:p>
           <a:p>
             <a:pPr eaLnBrk="0" hangingPunct="0">
+              <a:lnSpc>
+                <a:spcPct val="125000"/>
+              </a:lnSpc>
               <a:spcBef>
                 <a:spcPts val="300"/>
               </a:spcBef>
@@ -16376,7 +15721,7 @@
               <a:buSzPct val="70000"/>
             </a:pPr>
             <a:r>
-              <a:rPr lang="en-US" sz="2799" b="1" noProof="1">
+              <a:rPr lang="en-US" sz="3400" b="1" noProof="1">
                 <a:solidFill>
                   <a:schemeClr val="bg1"/>
                 </a:solidFill>
@@ -16386,14 +15731,14 @@
               <a:t>bool</a:t>
             </a:r>
             <a:r>
-              <a:rPr lang="en-US" sz="2799" b="1" noProof="1">
+              <a:rPr lang="en-US" sz="3400" b="1" noProof="1">
                 <a:latin typeface="Consolas" pitchFamily="49" charset="0"/>
                 <a:cs typeface="Consolas" pitchFamily="49" charset="0"/>
               </a:rPr>
               <a:t> exists = stack.</a:t>
             </a:r>
             <a:r>
-              <a:rPr lang="en-US" sz="2799" b="1" noProof="1">
+              <a:rPr lang="en-US" sz="3400" b="1" noProof="1">
                 <a:solidFill>
                   <a:schemeClr val="bg1"/>
                 </a:solidFill>
@@ -16403,14 +15748,14 @@
               <a:t>Contains(</a:t>
             </a:r>
             <a:r>
-              <a:rPr lang="en-US" sz="2799" b="1" noProof="1">
+              <a:rPr lang="en-US" sz="3400" b="1" noProof="1">
                 <a:latin typeface="Consolas" pitchFamily="49" charset="0"/>
                 <a:cs typeface="Consolas" pitchFamily="49" charset="0"/>
               </a:rPr>
               <a:t>2</a:t>
             </a:r>
             <a:r>
-              <a:rPr lang="en-US" sz="2799" b="1" noProof="1">
+              <a:rPr lang="en-US" sz="3400" b="1" noProof="1">
                 <a:solidFill>
                   <a:schemeClr val="bg1"/>
                 </a:solidFill>
@@ -16420,7 +15765,7 @@
               <a:t>)</a:t>
             </a:r>
             <a:r>
-              <a:rPr lang="en-US" sz="2799" b="1" noProof="1">
+              <a:rPr lang="en-US" sz="3400" b="1" noProof="1">
                 <a:latin typeface="Consolas" pitchFamily="49" charset="0"/>
                 <a:cs typeface="Consolas" pitchFamily="49" charset="0"/>
               </a:rPr>
@@ -16429,6 +15774,9 @@
           </a:p>
           <a:p>
             <a:pPr eaLnBrk="0" hangingPunct="0">
+              <a:lnSpc>
+                <a:spcPct val="125000"/>
+              </a:lnSpc>
               <a:spcBef>
                 <a:spcPts val="300"/>
               </a:spcBef>
@@ -16444,7 +15792,7 @@
               <a:buSzPct val="70000"/>
             </a:pPr>
             <a:r>
-              <a:rPr lang="en-US" sz="2799" b="1" noProof="1">
+              <a:rPr lang="en-US" sz="3400" b="1" noProof="1">
                 <a:solidFill>
                   <a:schemeClr val="bg1"/>
                 </a:solidFill>
@@ -16454,14 +15802,14 @@
               <a:t>int[]</a:t>
             </a:r>
             <a:r>
-              <a:rPr lang="en-US" sz="2799" b="1" noProof="1">
+              <a:rPr lang="en-US" sz="3400" b="1" noProof="1">
                 <a:latin typeface="Consolas" pitchFamily="49" charset="0"/>
                 <a:cs typeface="Consolas" pitchFamily="49" charset="0"/>
               </a:rPr>
               <a:t> array = stack.</a:t>
             </a:r>
             <a:r>
-              <a:rPr lang="en-US" sz="2799" b="1" noProof="1">
+              <a:rPr lang="en-US" sz="3400" b="1" noProof="1">
                 <a:solidFill>
                   <a:schemeClr val="bg1"/>
                 </a:solidFill>
@@ -16471,7 +15819,7 @@
               <a:t>ToArray()</a:t>
             </a:r>
             <a:r>
-              <a:rPr lang="en-US" sz="2799" b="1" noProof="1">
+              <a:rPr lang="en-US" sz="3400" b="1" noProof="1">
                 <a:latin typeface="Consolas" pitchFamily="49" charset="0"/>
                 <a:cs typeface="Consolas" pitchFamily="49" charset="0"/>
               </a:rPr>
@@ -16480,6 +15828,9 @@
           </a:p>
           <a:p>
             <a:pPr eaLnBrk="0" hangingPunct="0">
+              <a:lnSpc>
+                <a:spcPct val="125000"/>
+              </a:lnSpc>
               <a:spcBef>
                 <a:spcPts val="300"/>
               </a:spcBef>
@@ -16495,14 +15846,14 @@
               <a:buSzPct val="70000"/>
             </a:pPr>
             <a:r>
-              <a:rPr lang="en-US" sz="2799" b="1" noProof="1">
+              <a:rPr lang="en-US" sz="3400" b="1" noProof="1">
                 <a:latin typeface="Consolas" pitchFamily="49" charset="0"/>
                 <a:cs typeface="Consolas" pitchFamily="49" charset="0"/>
               </a:rPr>
               <a:t>stack.</a:t>
             </a:r>
             <a:r>
-              <a:rPr lang="en-US" sz="2799" b="1" noProof="1">
+              <a:rPr lang="en-US" sz="3400" b="1" noProof="1">
                 <a:solidFill>
                   <a:schemeClr val="bg1"/>
                 </a:solidFill>
@@ -16512,7 +15863,7 @@
               <a:t>Clear()</a:t>
             </a:r>
             <a:r>
-              <a:rPr lang="en-US" sz="2799" b="1" noProof="1">
+              <a:rPr lang="en-US" sz="3400" b="1" noProof="1">
                 <a:latin typeface="Consolas" pitchFamily="49" charset="0"/>
                 <a:cs typeface="Consolas" pitchFamily="49" charset="0"/>
               </a:rPr>
@@ -16521,6 +15872,9 @@
           </a:p>
           <a:p>
             <a:pPr eaLnBrk="0" hangingPunct="0">
+              <a:lnSpc>
+                <a:spcPct val="125000"/>
+              </a:lnSpc>
               <a:spcBef>
                 <a:spcPts val="300"/>
               </a:spcBef>
@@ -16536,14 +15890,14 @@
               <a:buSzPct val="70000"/>
             </a:pPr>
             <a:r>
-              <a:rPr lang="en-US" sz="2799" b="1" noProof="1">
+              <a:rPr lang="en-US" sz="3400" b="1" noProof="1">
                 <a:latin typeface="Consolas" pitchFamily="49" charset="0"/>
                 <a:cs typeface="Consolas" pitchFamily="49" charset="0"/>
               </a:rPr>
               <a:t>stack.</a:t>
             </a:r>
             <a:r>
-              <a:rPr lang="en-US" sz="2799" b="1" noProof="1">
+              <a:rPr lang="en-US" sz="3400" b="1" noProof="1">
                 <a:solidFill>
                   <a:schemeClr val="bg1"/>
                 </a:solidFill>
@@ -16553,7 +15907,7 @@
               <a:t>TrimExcess()</a:t>
             </a:r>
             <a:r>
-              <a:rPr lang="en-US" sz="2799" b="1" noProof="1">
+              <a:rPr lang="en-US" sz="3400" b="1" noProof="1">
                 <a:latin typeface="Consolas" pitchFamily="49" charset="0"/>
                 <a:cs typeface="Consolas" pitchFamily="49" charset="0"/>
               </a:rPr>
@@ -16578,13 +15932,13 @@
         </p:nvSpPr>
         <p:spPr bwMode="auto">
           <a:xfrm>
-            <a:off x="8120474" y="3445166"/>
-            <a:ext cx="2624235" cy="882424"/>
+            <a:off x="8141857" y="3834000"/>
+            <a:ext cx="3632030" cy="539742"/>
           </a:xfrm>
           <a:prstGeom prst="wedgeRoundRectCallout">
             <a:avLst>
-              <a:gd name="adj1" fmla="val -75343"/>
-              <a:gd name="adj2" fmla="val 22586"/>
+              <a:gd name="adj1" fmla="val -63849"/>
+              <a:gd name="adj2" fmla="val 13379"/>
               <a:gd name="adj3" fmla="val 16667"/>
             </a:avLst>
           </a:prstGeom>
@@ -16630,16 +15984,36 @@
           <a:p>
             <a:pPr algn="ctr"/>
             <a:r>
-              <a:rPr lang="en-US" sz="2350" b="1" dirty="0">
+              <a:rPr lang="bg-BG" sz="2400" b="1" dirty="0">
                 <a:solidFill>
                   <a:srgbClr val="FFFFFF"/>
                 </a:solidFill>
                 <a:ea typeface="+mn-lt"/>
                 <a:cs typeface="+mn-lt"/>
               </a:rPr>
-              <a:t>Запазва реда на елементите</a:t>
-            </a:r>
-            <a:endParaRPr lang="bg-BG" dirty="0"/>
+              <a:t>Превръща стека в </a:t>
+            </a:r>
+            <a:r>
+              <a:rPr lang="bg-BG" sz="2400" b="1" dirty="0">
+                <a:solidFill>
+                  <a:schemeClr val="bg1">
+                    <a:lumMod val="60000"/>
+                    <a:lumOff val="40000"/>
+                  </a:schemeClr>
+                </a:solidFill>
+                <a:ea typeface="+mn-lt"/>
+                <a:cs typeface="+mn-lt"/>
+              </a:rPr>
+              <a:t>масив</a:t>
+            </a:r>
+            <a:endParaRPr lang="bg-BG" sz="2400" dirty="0">
+              <a:solidFill>
+                <a:schemeClr val="bg1">
+                  <a:lumMod val="60000"/>
+                  <a:lumOff val="40000"/>
+                </a:schemeClr>
+              </a:solidFill>
+            </a:endParaRPr>
           </a:p>
         </p:txBody>
       </p:sp>
@@ -16659,13 +16033,13 @@
         </p:nvSpPr>
         <p:spPr bwMode="auto">
           <a:xfrm>
-            <a:off x="4974469" y="4418742"/>
-            <a:ext cx="4001532" cy="467078"/>
+            <a:off x="4880828" y="4716699"/>
+            <a:ext cx="4001532" cy="595185"/>
           </a:xfrm>
           <a:prstGeom prst="wedgeRoundRectCallout">
             <a:avLst>
-              <a:gd name="adj1" fmla="val -67769"/>
-              <a:gd name="adj2" fmla="val -10820"/>
+              <a:gd name="adj1" fmla="val -74723"/>
+              <a:gd name="adj2" fmla="val -15076"/>
               <a:gd name="adj3" fmla="val 16667"/>
             </a:avLst>
           </a:prstGeom>
@@ -16711,14 +16085,25 @@
           <a:p>
             <a:pPr algn="ctr"/>
             <a:r>
-              <a:rPr lang="en-US" sz="2350" b="1" dirty="0">
+              <a:rPr lang="en-US" sz="2400" b="1" dirty="0">
+                <a:solidFill>
+                  <a:schemeClr val="bg1">
+                    <a:lumMod val="60000"/>
+                    <a:lumOff val="40000"/>
+                  </a:schemeClr>
+                </a:solidFill>
+              </a:rPr>
+              <a:t>Премахва</a:t>
+            </a:r>
+            <a:r>
+              <a:rPr lang="en-US" sz="2400" b="1" dirty="0">
                 <a:solidFill>
                   <a:srgbClr val="FFFFFF"/>
                 </a:solidFill>
               </a:rPr>
-              <a:t>Премахва всички елементи </a:t>
-            </a:r>
-            <a:endParaRPr lang="bg-BG" sz="2399" b="1" dirty="0">
+              <a:t> всички елементи </a:t>
+            </a:r>
+            <a:endParaRPr lang="bg-BG" sz="2400" b="1" dirty="0">
               <a:solidFill>
                 <a:srgbClr val="FFFFFF"/>
               </a:solidFill>
@@ -16742,12 +16127,12 @@
         </p:nvSpPr>
         <p:spPr bwMode="auto">
           <a:xfrm>
-            <a:off x="5869435" y="5023362"/>
-            <a:ext cx="2982110" cy="872773"/>
+            <a:off x="5755538" y="5558639"/>
+            <a:ext cx="4772635" cy="595184"/>
           </a:xfrm>
           <a:prstGeom prst="wedgeRoundRectCallout">
             <a:avLst>
-              <a:gd name="adj1" fmla="val -70512"/>
+              <a:gd name="adj1" fmla="val -65097"/>
               <a:gd name="adj2" fmla="val -36172"/>
               <a:gd name="adj3" fmla="val 16667"/>
             </a:avLst>
@@ -16794,16 +16179,19 @@
           <a:p>
             <a:pPr algn="ctr"/>
             <a:r>
-              <a:rPr lang="bg-BG" sz="2350" b="1" dirty="0">
-                <a:solidFill>
-                  <a:srgbClr val="FFFFFF"/>
+              <a:rPr lang="bg-BG" sz="2400" b="1" dirty="0">
+                <a:solidFill>
+                  <a:schemeClr val="bg1">
+                    <a:lumMod val="60000"/>
+                    <a:lumOff val="40000"/>
+                  </a:schemeClr>
                 </a:solidFill>
                 <a:cs typeface="Calibri"/>
               </a:rPr>
               <a:t>Преоразмерява</a:t>
             </a:r>
             <a:r>
-              <a:rPr lang="en-US" sz="2350" b="1" dirty="0">
+              <a:rPr lang="en-US" sz="2400" b="1" dirty="0">
                 <a:solidFill>
                   <a:srgbClr val="FFFFFF"/>
                 </a:solidFill>
@@ -16853,6 +16241,211 @@
               <a:t>15</a:t>
             </a:fld>
             <a:endParaRPr lang="en-US" noProof="0" dirty="0"/>
+          </a:p>
+        </p:txBody>
+      </p:sp>
+      <p:sp>
+        <p:nvSpPr>
+          <p:cNvPr id="2" name="AutoShape 6">
+            <a:extLst>
+              <a:ext uri="{FF2B5EF4-FFF2-40B4-BE49-F238E27FC236}">
+                <a16:creationId xmlns:a16="http://schemas.microsoft.com/office/drawing/2014/main" id="{C07DE55F-537E-FD10-6BB9-BD8192CB58AA}"/>
+              </a:ext>
+            </a:extLst>
+          </p:cNvPr>
+          <p:cNvSpPr>
+            <a:spLocks noChangeArrowheads="1"/>
+          </p:cNvSpPr>
+          <p:nvPr/>
+        </p:nvSpPr>
+        <p:spPr bwMode="auto">
+          <a:xfrm>
+            <a:off x="7196570" y="2034258"/>
+            <a:ext cx="4001531" cy="539742"/>
+          </a:xfrm>
+          <a:prstGeom prst="wedgeRoundRectCallout">
+            <a:avLst>
+              <a:gd name="adj1" fmla="val -77827"/>
+              <a:gd name="adj2" fmla="val 72305"/>
+              <a:gd name="adj3" fmla="val 16667"/>
+            </a:avLst>
+          </a:prstGeom>
+          <a:solidFill>
+            <a:schemeClr val="dk2">
+              <a:alpha val="80000"/>
+            </a:schemeClr>
+          </a:solidFill>
+          <a:ln w="19050">
+            <a:solidFill>
+              <a:schemeClr val="tx1">
+                <a:lumMod val="75000"/>
+                <a:alpha val="80000"/>
+              </a:schemeClr>
+            </a:solidFill>
+          </a:ln>
+          <a:effectLst/>
+        </p:spPr>
+        <p:style>
+          <a:lnRef idx="2">
+            <a:schemeClr val="accent1">
+              <a:shade val="50000"/>
+            </a:schemeClr>
+          </a:lnRef>
+          <a:fillRef idx="1001">
+            <a:schemeClr val="dk2"/>
+          </a:fillRef>
+          <a:effectRef idx="0">
+            <a:schemeClr val="accent1"/>
+          </a:effectRef>
+          <a:fontRef idx="minor">
+            <a:schemeClr val="lt1"/>
+          </a:fontRef>
+        </p:style>
+        <p:txBody>
+          <a:bodyPr rot="0" spcFirstLastPara="0" vertOverflow="overflow" horzOverflow="overflow" vert="horz" wrap="square" lIns="91416" tIns="45708" rIns="91416" bIns="45708" numCol="1" spcCol="0" rtlCol="0" fromWordArt="0" anchor="ctr" anchorCtr="0" forceAA="0" compatLnSpc="1">
+            <a:prstTxWarp prst="textNoShape">
+              <a:avLst/>
+            </a:prstTxWarp>
+            <a:noAutofit/>
+          </a:bodyPr>
+          <a:lstStyle/>
+          <a:p>
+            <a:pPr algn="ctr"/>
+            <a:r>
+              <a:rPr lang="bg-BG" sz="2400" b="1" dirty="0">
+                <a:solidFill>
+                  <a:srgbClr val="FFFFFF"/>
+                </a:solidFill>
+                <a:ea typeface="+mn-lt"/>
+                <a:cs typeface="+mn-lt"/>
+              </a:rPr>
+              <a:t>Връща </a:t>
+            </a:r>
+            <a:r>
+              <a:rPr lang="bg-BG" sz="2400" b="1" dirty="0">
+                <a:solidFill>
+                  <a:schemeClr val="bg1">
+                    <a:lumMod val="60000"/>
+                    <a:lumOff val="40000"/>
+                  </a:schemeClr>
+                </a:solidFill>
+                <a:ea typeface="+mn-lt"/>
+                <a:cs typeface="+mn-lt"/>
+              </a:rPr>
+              <a:t>броя</a:t>
+            </a:r>
+            <a:r>
+              <a:rPr lang="bg-BG" sz="2400" b="1" dirty="0">
+                <a:solidFill>
+                  <a:srgbClr val="FFFFFF"/>
+                </a:solidFill>
+                <a:ea typeface="+mn-lt"/>
+                <a:cs typeface="+mn-lt"/>
+              </a:rPr>
+              <a:t> на елементите</a:t>
+            </a:r>
+            <a:endParaRPr lang="bg-BG" sz="2400" dirty="0"/>
+          </a:p>
+        </p:txBody>
+      </p:sp>
+      <p:sp>
+        <p:nvSpPr>
+          <p:cNvPr id="3" name="AutoShape 6">
+            <a:extLst>
+              <a:ext uri="{FF2B5EF4-FFF2-40B4-BE49-F238E27FC236}">
+                <a16:creationId xmlns:a16="http://schemas.microsoft.com/office/drawing/2014/main" id="{E4AB8CAC-A7F3-2664-627B-0469ED79D32D}"/>
+              </a:ext>
+            </a:extLst>
+          </p:cNvPr>
+          <p:cNvSpPr>
+            <a:spLocks noChangeArrowheads="1"/>
+          </p:cNvSpPr>
+          <p:nvPr/>
+        </p:nvSpPr>
+        <p:spPr bwMode="auto">
+          <a:xfrm>
+            <a:off x="8331119" y="2790353"/>
+            <a:ext cx="3632031" cy="818647"/>
+          </a:xfrm>
+          <a:prstGeom prst="wedgeRoundRectCallout">
+            <a:avLst>
+              <a:gd name="adj1" fmla="val -57540"/>
+              <a:gd name="adj2" fmla="val 25146"/>
+              <a:gd name="adj3" fmla="val 16667"/>
+            </a:avLst>
+          </a:prstGeom>
+          <a:solidFill>
+            <a:schemeClr val="dk2">
+              <a:alpha val="80000"/>
+            </a:schemeClr>
+          </a:solidFill>
+          <a:ln w="19050">
+            <a:solidFill>
+              <a:schemeClr val="tx1">
+                <a:lumMod val="75000"/>
+                <a:alpha val="80000"/>
+              </a:schemeClr>
+            </a:solidFill>
+          </a:ln>
+          <a:effectLst/>
+        </p:spPr>
+        <p:style>
+          <a:lnRef idx="2">
+            <a:schemeClr val="accent1">
+              <a:shade val="50000"/>
+            </a:schemeClr>
+          </a:lnRef>
+          <a:fillRef idx="1001">
+            <a:schemeClr val="dk2"/>
+          </a:fillRef>
+          <a:effectRef idx="0">
+            <a:schemeClr val="accent1"/>
+          </a:effectRef>
+          <a:fontRef idx="minor">
+            <a:schemeClr val="lt1"/>
+          </a:fontRef>
+        </p:style>
+        <p:txBody>
+          <a:bodyPr rot="0" spcFirstLastPara="0" vertOverflow="overflow" horzOverflow="overflow" vert="horz" wrap="square" lIns="91416" tIns="45708" rIns="91416" bIns="45708" numCol="1" spcCol="0" rtlCol="0" fromWordArt="0" anchor="ctr" anchorCtr="0" forceAA="0" compatLnSpc="1">
+            <a:prstTxWarp prst="textNoShape">
+              <a:avLst/>
+            </a:prstTxWarp>
+            <a:noAutofit/>
+          </a:bodyPr>
+          <a:lstStyle/>
+          <a:p>
+            <a:pPr algn="ctr"/>
+            <a:r>
+              <a:rPr lang="bg-BG" sz="2400" b="1" dirty="0">
+                <a:solidFill>
+                  <a:srgbClr val="FFFFFF"/>
+                </a:solidFill>
+                <a:ea typeface="+mn-lt"/>
+                <a:cs typeface="+mn-lt"/>
+              </a:rPr>
+              <a:t>Проверява дали стекът </a:t>
+            </a:r>
+            <a:r>
+              <a:rPr lang="bg-BG" sz="2400" b="1" dirty="0">
+                <a:solidFill>
+                  <a:schemeClr val="bg1">
+                    <a:lumMod val="60000"/>
+                    <a:lumOff val="40000"/>
+                  </a:schemeClr>
+                </a:solidFill>
+                <a:ea typeface="+mn-lt"/>
+                <a:cs typeface="+mn-lt"/>
+              </a:rPr>
+              <a:t>съдържа елемента</a:t>
+            </a:r>
+            <a:endParaRPr lang="bg-BG" sz="2400" dirty="0">
+              <a:solidFill>
+                <a:schemeClr val="bg1">
+                  <a:lumMod val="60000"/>
+                  <a:lumOff val="40000"/>
+                </a:schemeClr>
+              </a:solidFill>
+            </a:endParaRPr>
           </a:p>
         </p:txBody>
       </p:sp>
@@ -16925,25 +16518,39 @@
                                   </p:childTnLst>
                                 </p:cTn>
                               </p:par>
+                            </p:childTnLst>
+                          </p:cTn>
+                        </p:par>
+                      </p:childTnLst>
+                    </p:cTn>
+                  </p:par>
+                  <p:par>
+                    <p:cTn id="7" fill="hold">
+                      <p:stCondLst>
+                        <p:cond delay="indefinite"/>
+                      </p:stCondLst>
+                      <p:childTnLst>
+                        <p:par>
+                          <p:cTn id="8" fill="hold">
+                            <p:stCondLst>
+                              <p:cond delay="0"/>
+                            </p:stCondLst>
+                            <p:childTnLst>
                               <p:par>
-                                <p:cTn id="7" presetID="1" presetClass="entr" presetSubtype="0" fill="hold" nodeType="withEffect">
+                                <p:cTn id="9" presetID="1" presetClass="entr" presetSubtype="0" fill="hold" grpId="0" nodeType="clickEffect">
                                   <p:stCondLst>
                                     <p:cond delay="0"/>
                                   </p:stCondLst>
                                   <p:childTnLst>
                                     <p:set>
                                       <p:cBhvr>
-                                        <p:cTn id="8" dur="1" fill="hold">
+                                        <p:cTn id="10" dur="1" fill="hold">
                                           <p:stCondLst>
                                             <p:cond delay="0"/>
                                           </p:stCondLst>
                                         </p:cTn>
                                         <p:tgtEl>
-                                          <p:spTgt spid="20">
-                                            <p:txEl>
-                                              <p:pRg st="3" end="3"/>
-                                            </p:txEl>
-                                          </p:spTgt>
+                                          <p:spTgt spid="2"/>
                                         </p:tgtEl>
                                         <p:attrNameLst>
                                           <p:attrName>style.visibility</p:attrName>
@@ -16963,50 +16570,19 @@
                     </p:cTn>
                   </p:par>
                   <p:par>
-                    <p:cTn id="9" fill="hold">
+                    <p:cTn id="11" fill="hold">
                       <p:stCondLst>
                         <p:cond delay="indefinite"/>
                       </p:stCondLst>
                       <p:childTnLst>
                         <p:par>
-                          <p:cTn id="10" fill="hold">
+                          <p:cTn id="12" fill="hold">
                             <p:stCondLst>
                               <p:cond delay="0"/>
                             </p:stCondLst>
                             <p:childTnLst>
                               <p:par>
-                                <p:cTn id="11" presetID="1" presetClass="entr" presetSubtype="0" fill="hold" nodeType="clickEffect">
-                                  <p:stCondLst>
-                                    <p:cond delay="0"/>
-                                  </p:stCondLst>
-                                  <p:childTnLst>
-                                    <p:set>
-                                      <p:cBhvr>
-                                        <p:cTn id="12" dur="1" fill="hold">
-                                          <p:stCondLst>
-                                            <p:cond delay="0"/>
-                                          </p:stCondLst>
-                                        </p:cTn>
-                                        <p:tgtEl>
-                                          <p:spTgt spid="20">
-                                            <p:txEl>
-                                              <p:pRg st="4" end="4"/>
-                                            </p:txEl>
-                                          </p:spTgt>
-                                        </p:tgtEl>
-                                        <p:attrNameLst>
-                                          <p:attrName>style.visibility</p:attrName>
-                                        </p:attrNameLst>
-                                      </p:cBhvr>
-                                      <p:to>
-                                        <p:strVal val="visible"/>
-                                      </p:to>
-                                    </p:set>
-                                  </p:childTnLst>
-                                </p:cTn>
-                              </p:par>
-                              <p:par>
-                                <p:cTn id="13" presetID="1" presetClass="entr" presetSubtype="0" fill="hold" grpId="0" nodeType="withEffect">
+                                <p:cTn id="13" presetID="1" presetClass="entr" presetSubtype="0" fill="hold" nodeType="clickEffect">
                                   <p:stCondLst>
                                     <p:cond delay="0"/>
                                   </p:stCondLst>
@@ -17019,7 +16595,11 @@
                                           </p:stCondLst>
                                         </p:cTn>
                                         <p:tgtEl>
-                                          <p:spTgt spid="11"/>
+                                          <p:spTgt spid="20">
+                                            <p:txEl>
+                                              <p:pRg st="3" end="3"/>
+                                            </p:txEl>
+                                          </p:spTgt>
                                         </p:tgtEl>
                                         <p:attrNameLst>
                                           <p:attrName>style.visibility</p:attrName>
@@ -17051,7 +16631,7 @@
                             </p:stCondLst>
                             <p:childTnLst>
                               <p:par>
-                                <p:cTn id="17" presetID="1" presetClass="entr" presetSubtype="0" fill="hold" nodeType="clickEffect">
+                                <p:cTn id="17" presetID="1" presetClass="entr" presetSubtype="0" fill="hold" grpId="0" nodeType="clickEffect">
                                   <p:stCondLst>
                                     <p:cond delay="0"/>
                                   </p:stCondLst>
@@ -17059,6 +16639,145 @@
                                     <p:set>
                                       <p:cBhvr>
                                         <p:cTn id="18" dur="1" fill="hold">
+                                          <p:stCondLst>
+                                            <p:cond delay="0"/>
+                                          </p:stCondLst>
+                                        </p:cTn>
+                                        <p:tgtEl>
+                                          <p:spTgt spid="3"/>
+                                        </p:tgtEl>
+                                        <p:attrNameLst>
+                                          <p:attrName>style.visibility</p:attrName>
+                                        </p:attrNameLst>
+                                      </p:cBhvr>
+                                      <p:to>
+                                        <p:strVal val="visible"/>
+                                      </p:to>
+                                    </p:set>
+                                  </p:childTnLst>
+                                </p:cTn>
+                              </p:par>
+                            </p:childTnLst>
+                          </p:cTn>
+                        </p:par>
+                      </p:childTnLst>
+                    </p:cTn>
+                  </p:par>
+                  <p:par>
+                    <p:cTn id="19" fill="hold">
+                      <p:stCondLst>
+                        <p:cond delay="indefinite"/>
+                      </p:stCondLst>
+                      <p:childTnLst>
+                        <p:par>
+                          <p:cTn id="20" fill="hold">
+                            <p:stCondLst>
+                              <p:cond delay="0"/>
+                            </p:stCondLst>
+                            <p:childTnLst>
+                              <p:par>
+                                <p:cTn id="21" presetID="1" presetClass="entr" presetSubtype="0" fill="hold" nodeType="clickEffect">
+                                  <p:stCondLst>
+                                    <p:cond delay="0"/>
+                                  </p:stCondLst>
+                                  <p:childTnLst>
+                                    <p:set>
+                                      <p:cBhvr>
+                                        <p:cTn id="22" dur="1" fill="hold">
+                                          <p:stCondLst>
+                                            <p:cond delay="0"/>
+                                          </p:stCondLst>
+                                        </p:cTn>
+                                        <p:tgtEl>
+                                          <p:spTgt spid="20">
+                                            <p:txEl>
+                                              <p:pRg st="4" end="4"/>
+                                            </p:txEl>
+                                          </p:spTgt>
+                                        </p:tgtEl>
+                                        <p:attrNameLst>
+                                          <p:attrName>style.visibility</p:attrName>
+                                        </p:attrNameLst>
+                                      </p:cBhvr>
+                                      <p:to>
+                                        <p:strVal val="visible"/>
+                                      </p:to>
+                                    </p:set>
+                                  </p:childTnLst>
+                                </p:cTn>
+                              </p:par>
+                            </p:childTnLst>
+                          </p:cTn>
+                        </p:par>
+                      </p:childTnLst>
+                    </p:cTn>
+                  </p:par>
+                  <p:par>
+                    <p:cTn id="23" fill="hold">
+                      <p:stCondLst>
+                        <p:cond delay="indefinite"/>
+                      </p:stCondLst>
+                      <p:childTnLst>
+                        <p:par>
+                          <p:cTn id="24" fill="hold">
+                            <p:stCondLst>
+                              <p:cond delay="0"/>
+                            </p:stCondLst>
+                            <p:childTnLst>
+                              <p:par>
+                                <p:cTn id="25" presetID="1" presetClass="entr" presetSubtype="0" fill="hold" grpId="0" nodeType="clickEffect">
+                                  <p:stCondLst>
+                                    <p:cond delay="0"/>
+                                  </p:stCondLst>
+                                  <p:childTnLst>
+                                    <p:set>
+                                      <p:cBhvr>
+                                        <p:cTn id="26" dur="1" fill="hold">
+                                          <p:stCondLst>
+                                            <p:cond delay="0"/>
+                                          </p:stCondLst>
+                                        </p:cTn>
+                                        <p:tgtEl>
+                                          <p:spTgt spid="11"/>
+                                        </p:tgtEl>
+                                        <p:attrNameLst>
+                                          <p:attrName>style.visibility</p:attrName>
+                                        </p:attrNameLst>
+                                      </p:cBhvr>
+                                      <p:to>
+                                        <p:strVal val="visible"/>
+                                      </p:to>
+                                    </p:set>
+                                  </p:childTnLst>
+                                </p:cTn>
+                              </p:par>
+                            </p:childTnLst>
+                          </p:cTn>
+                        </p:par>
+                      </p:childTnLst>
+                    </p:cTn>
+                  </p:par>
+                  <p:par>
+                    <p:cTn id="27" fill="hold">
+                      <p:stCondLst>
+                        <p:cond delay="indefinite"/>
+                      </p:stCondLst>
+                      <p:childTnLst>
+                        <p:par>
+                          <p:cTn id="28" fill="hold">
+                            <p:stCondLst>
+                              <p:cond delay="0"/>
+                            </p:stCondLst>
+                            <p:childTnLst>
+                              <p:par>
+                                <p:cTn id="29" presetID="1" presetClass="entr" presetSubtype="0" fill="hold" nodeType="clickEffect">
+                                  <p:stCondLst>
+                                    <p:cond delay="0"/>
+                                  </p:stCondLst>
+                                  <p:childTnLst>
+                                    <p:set>
+                                      <p:cBhvr>
+                                        <p:cTn id="30" dur="1" fill="hold">
                                           <p:stCondLst>
                                             <p:cond delay="0"/>
                                           </p:stCondLst>
@@ -17081,15 +16800,33 @@
                                   </p:childTnLst>
                                 </p:cTn>
                               </p:par>
+                            </p:childTnLst>
+                          </p:cTn>
+                        </p:par>
+                      </p:childTnLst>
+                    </p:cTn>
+                  </p:par>
+                  <p:par>
+                    <p:cTn id="31" fill="hold">
+                      <p:stCondLst>
+                        <p:cond delay="indefinite"/>
+                      </p:stCondLst>
+                      <p:childTnLst>
+                        <p:par>
+                          <p:cTn id="32" fill="hold">
+                            <p:stCondLst>
+                              <p:cond delay="0"/>
+                            </p:stCondLst>
+                            <p:childTnLst>
                               <p:par>
-                                <p:cTn id="19" presetID="1" presetClass="entr" presetSubtype="0" fill="hold" grpId="0" nodeType="withEffect">
+                                <p:cTn id="33" presetID="1" presetClass="entr" presetSubtype="0" fill="hold" grpId="0" nodeType="clickEffect">
                                   <p:stCondLst>
                                     <p:cond delay="0"/>
                                   </p:stCondLst>
                                   <p:childTnLst>
                                     <p:set>
                                       <p:cBhvr>
-                                        <p:cTn id="20" dur="1" fill="hold">
+                                        <p:cTn id="34" dur="1" fill="hold">
                                           <p:stCondLst>
                                             <p:cond delay="0"/>
                                           </p:stCondLst>
@@ -17115,26 +16852,26 @@
                     </p:cTn>
                   </p:par>
                   <p:par>
-                    <p:cTn id="21" fill="hold">
+                    <p:cTn id="35" fill="hold">
                       <p:stCondLst>
                         <p:cond delay="indefinite"/>
                       </p:stCondLst>
                       <p:childTnLst>
                         <p:par>
-                          <p:cTn id="22" fill="hold">
+                          <p:cTn id="36" fill="hold">
                             <p:stCondLst>
                               <p:cond delay="0"/>
                             </p:stCondLst>
                             <p:childTnLst>
                               <p:par>
-                                <p:cTn id="23" presetID="1" presetClass="entr" presetSubtype="0" fill="hold" nodeType="clickEffect">
+                                <p:cTn id="37" presetID="1" presetClass="entr" presetSubtype="0" fill="hold" nodeType="clickEffect">
                                   <p:stCondLst>
                                     <p:cond delay="0"/>
                                   </p:stCondLst>
                                   <p:childTnLst>
                                     <p:set>
                                       <p:cBhvr>
-                                        <p:cTn id="24" dur="1" fill="hold">
+                                        <p:cTn id="38" dur="1" fill="hold">
                                           <p:stCondLst>
                                             <p:cond delay="0"/>
                                           </p:stCondLst>
@@ -17157,15 +16894,33 @@
                                   </p:childTnLst>
                                 </p:cTn>
                               </p:par>
+                            </p:childTnLst>
+                          </p:cTn>
+                        </p:par>
+                      </p:childTnLst>
+                    </p:cTn>
+                  </p:par>
+                  <p:par>
+                    <p:cTn id="39" fill="hold">
+                      <p:stCondLst>
+                        <p:cond delay="indefinite"/>
+                      </p:stCondLst>
+                      <p:childTnLst>
+                        <p:par>
+                          <p:cTn id="40" fill="hold">
+                            <p:stCondLst>
+                              <p:cond delay="0"/>
+                            </p:stCondLst>
+                            <p:childTnLst>
                               <p:par>
-                                <p:cTn id="25" presetID="1" presetClass="entr" presetSubtype="0" fill="hold" grpId="0" nodeType="withEffect">
+                                <p:cTn id="41" presetID="1" presetClass="entr" presetSubtype="0" fill="hold" grpId="0" nodeType="clickEffect">
                                   <p:stCondLst>
                                     <p:cond delay="0"/>
                                   </p:stCondLst>
                                   <p:childTnLst>
                                     <p:set>
                                       <p:cBhvr>
-                                        <p:cTn id="26" dur="1" fill="hold">
+                                        <p:cTn id="42" dur="1" fill="hold">
                                           <p:stCondLst>
                                             <p:cond delay="0"/>
                                           </p:stCondLst>
@@ -17215,6 +16970,8 @@
       <p:bldP spid="11" grpId="0" animBg="1"/>
       <p:bldP spid="12" grpId="0" animBg="1"/>
       <p:bldP spid="13" grpId="0" animBg="1"/>
+      <p:bldP spid="2" grpId="0" animBg="1"/>
+      <p:bldP spid="3" grpId="0" animBg="1"/>
     </p:bldLst>
   </p:timing>
 </p:sld>
@@ -18499,17 +18256,17 @@
                 <a:latin typeface="Consolas"/>
                 <a:cs typeface="Consolas" pitchFamily="49" charset="0"/>
               </a:rPr>
-              <a:t>    // </a:t>
-            </a:r>
-            <a:r>
-              <a:rPr lang="en-US" sz="2550" b="1" noProof="1">
+              <a:t>    // TODO:</a:t>
+            </a:r>
+            <a:r>
+              <a:rPr lang="bg-BG" sz="2550" b="1" i="1" noProof="1">
                 <a:solidFill>
                   <a:schemeClr val="accent2"/>
                 </a:solidFill>
                 <a:latin typeface="Consolas"/>
                 <a:cs typeface="Consolas" pitchFamily="49" charset="0"/>
               </a:rPr>
-              <a:t>TODO: Парсваме числата и ги добавяме</a:t>
+              <a:t> Добавете числата</a:t>
             </a:r>
             <a:endParaRPr lang="bg-BG" sz="2599" b="1" i="1" noProof="1">
               <a:solidFill>
@@ -19333,7 +19090,21 @@
                 <a:ea typeface="+mn-lt"/>
                 <a:cs typeface="+mn-lt"/>
               </a:rPr>
-              <a:t>Тествайте решението в Judge: </a:t>
+              <a:t>Тествайте решението</a:t>
+            </a:r>
+            <a:r>
+              <a:rPr lang="bg-BG" sz="1750" dirty="0">
+                <a:ea typeface="+mn-lt"/>
+                <a:cs typeface="+mn-lt"/>
+              </a:rPr>
+              <a:t> си</a:t>
+            </a:r>
+            <a:r>
+              <a:rPr lang="en-US" sz="1750" dirty="0">
+                <a:ea typeface="+mn-lt"/>
+                <a:cs typeface="+mn-lt"/>
+              </a:rPr>
+              <a:t> в Judge: </a:t>
             </a:r>
             <a:r>
               <a:rPr lang="en-US" sz="1750" u="sng" dirty="0">
@@ -21097,10 +20868,10 @@
       </p:grpSpPr>
       <p:sp>
         <p:nvSpPr>
-          <p:cNvPr id="3" name="Content Placeholder 2">
+          <p:cNvPr id="6" name="Text Placeholder 5">
             <a:extLst>
               <a:ext uri="{FF2B5EF4-FFF2-40B4-BE49-F238E27FC236}">
-                <a16:creationId xmlns:a16="http://schemas.microsoft.com/office/drawing/2014/main" id="{ACAA566F-0E0E-4BF9-A3B0-6F01080380A3}"/>
+                <a16:creationId xmlns:a16="http://schemas.microsoft.com/office/drawing/2014/main" id="{DB158218-8E6A-89B5-7DED-E61EC3B83B6F}"/>
               </a:ext>
             </a:extLst>
           </p:cNvPr>
@@ -21111,15 +20882,10 @@
             <p:ph type="body" sz="quarter" idx="13"/>
           </p:nvPr>
         </p:nvSpPr>
-        <p:spPr>
-          <a:xfrm>
-            <a:off x="523586" y="1407655"/>
-            <a:ext cx="9049234" cy="5207396"/>
-          </a:xfrm>
-        </p:spPr>
+        <p:spPr/>
         <p:txBody>
-          <a:bodyPr vert="horz" lIns="108000" tIns="36000" rIns="108000" bIns="36000" rtlCol="0" anchor="t">
-            <a:normAutofit fontScale="92500"/>
+          <a:bodyPr>
+            <a:normAutofit lnSpcReduction="10000"/>
           </a:bodyPr>
           <a:lstStyle/>
           <a:p>
@@ -21129,12 +20895,28 @@
               </a:buClr>
             </a:pPr>
             <a:r>
+              <a:rPr lang="bg-BG" sz="3550" dirty="0">
+                <a:solidFill>
+                  <a:schemeClr val="bg1"/>
+                </a:solidFill>
+              </a:rPr>
+              <a:t>͏͏</a:t>
+            </a:r>
+            <a:r>
+              <a:rPr lang="bg-BG" sz="3550" b="1" dirty="0">
+                <a:solidFill>
+                  <a:schemeClr val="bg1"/>
+                </a:solidFill>
+              </a:rPr>
+              <a:t>Структури</a:t>
+            </a:r>
+            <a:r>
               <a:rPr lang="en-US" sz="3550" b="1" dirty="0">
                 <a:solidFill>
                   <a:schemeClr val="bg1"/>
                 </a:solidFill>
               </a:rPr>
-              <a:t>Структура от данни</a:t>
+              <a:t> от данни</a:t>
             </a:r>
             <a:endParaRPr lang="bg-BG" dirty="0">
               <a:solidFill>
@@ -21146,7 +20928,15 @@
             <a:pPr lvl="1" indent="-360045"/>
             <a:r>
               <a:rPr lang="en-US" sz="3350" dirty="0"/>
-              <a:t> Линейни стуктури от данни</a:t>
+              <a:t> Линейни </a:t>
+            </a:r>
+            <a:r>
+              <a:rPr lang="bg-BG" sz="3350" dirty="0"/>
+              <a:t>структури </a:t>
+            </a:r>
+            <a:r>
+              <a:rPr lang="en-US" sz="3350" dirty="0"/>
+              <a:t>от данни</a:t>
             </a:r>
             <a:endParaRPr lang="en-US" sz="3350" dirty="0">
               <a:cs typeface="Calibri"/>
@@ -21159,20 +20949,28 @@
               </a:buClr>
             </a:pPr>
             <a:r>
+              <a:rPr lang="bg-BG" sz="3550" dirty="0">
+                <a:solidFill>
+                  <a:schemeClr val="bg1"/>
+                </a:solidFill>
+              </a:rPr>
+              <a:t>͏</a:t>
+            </a:r>
+            <a:r>
+              <a:rPr lang="bg-BG" sz="3550" b="1" dirty="0">
+                <a:solidFill>
+                  <a:schemeClr val="bg1"/>
+                </a:solidFill>
+              </a:rPr>
+              <a:t>Стек – </a:t>
+            </a:r>
+            <a:r>
               <a:rPr lang="en-US" sz="3550" b="1" dirty="0">
                 <a:solidFill>
                   <a:schemeClr val="bg1"/>
                 </a:solidFill>
               </a:rPr>
               <a:t>Stack&lt;T&gt;</a:t>
-            </a:r>
-            <a:r>
-              <a:rPr lang="en-US" sz="3550" b="1" dirty="0"/>
-              <a:t> </a:t>
-            </a:r>
-            <a:r>
-              <a:rPr lang="en-US" sz="3550" dirty="0"/>
-              <a:t>(Вкаран последен, първи изкаран)</a:t>
             </a:r>
             <a:endParaRPr lang="en-US" sz="3550" dirty="0">
               <a:cs typeface="Calibri"/>
@@ -21210,31 +21008,28 @@
               </a:buClr>
             </a:pPr>
             <a:r>
+              <a:rPr lang="bg-BG" sz="3550" dirty="0">
+                <a:solidFill>
+                  <a:schemeClr val="bg1"/>
+                </a:solidFill>
+              </a:rPr>
+              <a:t>͏</a:t>
+            </a:r>
+            <a:r>
+              <a:rPr lang="bg-BG" sz="3550" b="1" dirty="0">
+                <a:solidFill>
+                  <a:schemeClr val="bg1"/>
+                </a:solidFill>
+              </a:rPr>
+              <a:t>Опашка – </a:t>
+            </a:r>
+            <a:r>
               <a:rPr lang="en-US" sz="3550" b="1" dirty="0">
                 <a:solidFill>
                   <a:schemeClr val="bg1"/>
                 </a:solidFill>
               </a:rPr>
               <a:t>Queue&lt;T&gt;</a:t>
-            </a:r>
-            <a:r>
-              <a:rPr lang="en-US" sz="3550" b="1" dirty="0"/>
-              <a:t> </a:t>
-            </a:r>
-            <a:r>
-              <a:rPr lang="en-US" sz="3550" dirty="0"/>
-              <a:t>(</a:t>
-            </a:r>
-            <a:r>
-              <a:rPr lang="en-US" sz="3550" dirty="0">
-                <a:ea typeface="+mn-lt"/>
-                <a:cs typeface="+mn-lt"/>
-              </a:rPr>
-              <a:t>Вкаран първи, първи изкаран</a:t>
-            </a:r>
-            <a:r>
-              <a:rPr lang="en-US" sz="3550" dirty="0"/>
-              <a:t>) </a:t>
             </a:r>
             <a:endParaRPr lang="en-US" sz="3550" dirty="0">
               <a:cs typeface="Calibri"/>
@@ -21274,6 +21069,9 @@
               <a:latin typeface="Consolas"/>
               <a:cs typeface="Calibri"/>
             </a:endParaRPr>
+          </a:p>
+          <a:p>
+            <a:endParaRPr lang="en-BG" dirty="0"/>
           </a:p>
         </p:txBody>
       </p:sp>
@@ -21293,22 +21091,20 @@
             <p:ph type="title"/>
           </p:nvPr>
         </p:nvSpPr>
-        <p:spPr/>
+        <p:spPr>
+          <a:xfrm>
+            <a:off x="190406" y="100750"/>
+            <a:ext cx="9715594" cy="882654"/>
+          </a:xfrm>
+        </p:spPr>
         <p:txBody>
           <a:bodyPr/>
           <a:lstStyle/>
           <a:p>
             <a:r>
-              <a:rPr lang="en-GB" sz="3950" dirty="0">
-                <a:ea typeface="+mj-lt"/>
-                <a:cs typeface="+mj-lt"/>
-              </a:rPr>
+              <a:rPr lang="en-GB" dirty="0"/>
               <a:t>Съдържание</a:t>
             </a:r>
-            <a:endParaRPr lang="en-GB" sz="3950" b="0" dirty="0">
-              <a:ea typeface="+mj-lt"/>
-              <a:cs typeface="+mj-lt"/>
-            </a:endParaRPr>
           </a:p>
         </p:txBody>
       </p:sp>
@@ -21494,9 +21290,9 @@
                                           </p:stCondLst>
                                         </p:cTn>
                                         <p:tgtEl>
-                                          <p:spTgt spid="3">
+                                          <p:spTgt spid="6">
                                             <p:txEl>
-                                              <p:pRg st="0" end="0"/>
+                                              <p:pRg st="2" end="2"/>
                                             </p:txEl>
                                           </p:spTgt>
                                         </p:tgtEl>
@@ -21525,9 +21321,9 @@
                                           </p:stCondLst>
                                         </p:cTn>
                                         <p:tgtEl>
-                                          <p:spTgt spid="3">
+                                          <p:spTgt spid="6">
                                             <p:txEl>
-                                              <p:pRg st="1" end="1"/>
+                                              <p:pRg st="3" end="3"/>
                                             </p:txEl>
                                           </p:spTgt>
                                         </p:tgtEl>
@@ -21574,9 +21370,9 @@
                                           </p:stCondLst>
                                         </p:cTn>
                                         <p:tgtEl>
-                                          <p:spTgt spid="3">
+                                          <p:spTgt spid="6">
                                             <p:txEl>
-                                              <p:pRg st="2" end="2"/>
+                                              <p:pRg st="4" end="4"/>
                                             </p:txEl>
                                           </p:spTgt>
                                         </p:tgtEl>
@@ -21605,87 +21401,7 @@
                                           </p:stCondLst>
                                         </p:cTn>
                                         <p:tgtEl>
-                                          <p:spTgt spid="3">
-                                            <p:txEl>
-                                              <p:pRg st="3" end="3"/>
-                                            </p:txEl>
-                                          </p:spTgt>
-                                        </p:tgtEl>
-                                        <p:attrNameLst>
-                                          <p:attrName>style.visibility</p:attrName>
-                                        </p:attrNameLst>
-                                      </p:cBhvr>
-                                      <p:to>
-                                        <p:strVal val="visible"/>
-                                      </p:to>
-                                    </p:set>
-                                  </p:childTnLst>
-                                </p:cTn>
-                              </p:par>
-                            </p:childTnLst>
-                          </p:cTn>
-                        </p:par>
-                      </p:childTnLst>
-                    </p:cTn>
-                  </p:par>
-                  <p:par>
-                    <p:cTn id="15" fill="hold">
-                      <p:stCondLst>
-                        <p:cond delay="indefinite"/>
-                      </p:stCondLst>
-                      <p:childTnLst>
-                        <p:par>
-                          <p:cTn id="16" fill="hold">
-                            <p:stCondLst>
-                              <p:cond delay="0"/>
-                            </p:stCondLst>
-                            <p:childTnLst>
-                              <p:par>
-                                <p:cTn id="17" presetID="1" presetClass="entr" presetSubtype="0" fill="hold" nodeType="clickEffect">
-                                  <p:stCondLst>
-                                    <p:cond delay="0"/>
-                                  </p:stCondLst>
-                                  <p:childTnLst>
-                                    <p:set>
-                                      <p:cBhvr>
-                                        <p:cTn id="18" dur="1" fill="hold">
-                                          <p:stCondLst>
-                                            <p:cond delay="0"/>
-                                          </p:stCondLst>
-                                        </p:cTn>
-                                        <p:tgtEl>
-                                          <p:spTgt spid="3">
-                                            <p:txEl>
-                                              <p:pRg st="4" end="4"/>
-                                            </p:txEl>
-                                          </p:spTgt>
-                                        </p:tgtEl>
-                                        <p:attrNameLst>
-                                          <p:attrName>style.visibility</p:attrName>
-                                        </p:attrNameLst>
-                                      </p:cBhvr>
-                                      <p:to>
-                                        <p:strVal val="visible"/>
-                                      </p:to>
-                                    </p:set>
-                                  </p:childTnLst>
-                                </p:cTn>
-                              </p:par>
-                              <p:par>
-                                <p:cTn id="19" presetID="1" presetClass="entr" presetSubtype="0" fill="hold" nodeType="withEffect">
-                                  <p:stCondLst>
-                                    <p:cond delay="0"/>
-                                  </p:stCondLst>
-                                  <p:childTnLst>
-                                    <p:set>
-                                      <p:cBhvr>
-                                        <p:cTn id="20" dur="1" fill="hold">
-                                          <p:stCondLst>
-                                            <p:cond delay="0"/>
-                                          </p:stCondLst>
-                                        </p:cTn>
-                                        <p:tgtEl>
-                                          <p:spTgt spid="3">
+                                          <p:spTgt spid="6">
                                             <p:txEl>
                                               <p:pRg st="5" end="5"/>
                                             </p:txEl>
@@ -22117,27 +21833,7 @@
                 <a:latin typeface="Consolas"/>
                 <a:cs typeface="Consolas" pitchFamily="49" charset="0"/>
               </a:rPr>
-              <a:t>// </a:t>
-            </a:r>
-            <a:r>
-              <a:rPr lang="en-US" sz="2750" b="1" noProof="1">
-                <a:solidFill>
-                  <a:schemeClr val="accent2"/>
-                </a:solidFill>
-                <a:latin typeface="Consolas"/>
-                <a:cs typeface="Consolas" pitchFamily="49" charset="0"/>
-              </a:rPr>
-              <a:t>TODO:</a:t>
-            </a:r>
-            <a:r>
-              <a:rPr lang="en-US" sz="2750" b="1" i="1" noProof="1">
-                <a:solidFill>
-                  <a:schemeClr val="accent2"/>
-                </a:solidFill>
-                <a:latin typeface="Consolas"/>
-                <a:cs typeface="Consolas" pitchFamily="49" charset="0"/>
-              </a:rPr>
-              <a:t> Добавете switch за операциите </a:t>
+              <a:t>// TODO: Добавете switch за операциите </a:t>
             </a:r>
             <a:endParaRPr lang="en-US" sz="2750" b="1" i="1" noProof="1">
               <a:solidFill>
@@ -23011,7 +22707,28 @@
                 <a:ea typeface="+mn-lt"/>
                 <a:cs typeface="+mn-lt"/>
               </a:rPr>
-              <a:t>Тествайте решението в Judge:</a:t>
+              <a:t>Тествайте решението</a:t>
+            </a:r>
+            <a:r>
+              <a:rPr lang="bg-BG" sz="1750" dirty="0">
+                <a:ea typeface="+mn-lt"/>
+                <a:cs typeface="+mn-lt"/>
+              </a:rPr>
+              <a:t> си</a:t>
+            </a:r>
+            <a:r>
+              <a:rPr lang="en-US" sz="1750" dirty="0">
+                <a:ea typeface="+mn-lt"/>
+                <a:cs typeface="+mn-lt"/>
+              </a:rPr>
+              <a:t> в Judge:</a:t>
+            </a:r>
+            <a:r>
+              <a:rPr lang="bg-BG" sz="1750" dirty="0">
+                <a:ea typeface="+mn-lt"/>
+                <a:cs typeface="+mn-lt"/>
+              </a:rPr>
+              <a:t> </a:t>
             </a:r>
             <a:r>
               <a:rPr lang="en-US" sz="1750" u="sng" dirty="0">
@@ -23347,27 +23064,27 @@
               </a:buClr>
             </a:pPr>
             <a:r>
-              <a:rPr lang="en-US" sz="3550" dirty="0"/>
+              <a:rPr lang="en-US" sz="3600" dirty="0"/>
               <a:t>Даден</a:t>
             </a:r>
             <a:r>
-              <a:rPr lang="en-US" sz="3550" dirty="0">
+              <a:rPr lang="en-US" sz="3600" dirty="0">
                 <a:solidFill>
                   <a:srgbClr val="234465"/>
                 </a:solidFill>
               </a:rPr>
-              <a:t> ви е </a:t>
-            </a:r>
-            <a:r>
-              <a:rPr lang="bg-BG" sz="3550" b="1" dirty="0">
+              <a:t> е </a:t>
+            </a:r>
+            <a:r>
+              <a:rPr lang="bg-BG" sz="3600" b="1" dirty="0">
                 <a:solidFill>
                   <a:schemeClr val="bg1"/>
                 </a:solidFill>
               </a:rPr>
-              <a:t>аритмичен</a:t>
-            </a:r>
-            <a:r>
-              <a:rPr lang="en-US" sz="3550" b="1" dirty="0">
+              <a:t>аритметичен</a:t>
+            </a:r>
+            <a:r>
+              <a:rPr lang="en-US" sz="3600" b="1" dirty="0">
                 <a:solidFill>
                   <a:schemeClr val="bg1"/>
                 </a:solidFill>
@@ -23375,7 +23092,7 @@
               <a:t> изра</a:t>
             </a:r>
             <a:r>
-              <a:rPr lang="bg-BG" sz="3550" b="1" dirty="0">
+              <a:rPr lang="bg-BG" sz="3600" b="1" dirty="0">
                 <a:solidFill>
                   <a:schemeClr val="bg1"/>
                 </a:solidFill>
@@ -23383,7 +23100,7 @@
               <a:t>з</a:t>
             </a:r>
             <a:r>
-              <a:rPr lang="en-US" sz="3550" b="1" dirty="0">
+              <a:rPr lang="en-US" sz="3600" b="1" dirty="0">
                 <a:solidFill>
                   <a:schemeClr val="bg1"/>
                 </a:solidFill>
@@ -23391,22 +23108,22 @@
               <a:t> </a:t>
             </a:r>
             <a:r>
-              <a:rPr lang="en-US" sz="3550" dirty="0"/>
-              <a:t>със скоби (</a:t>
-            </a:r>
-            <a:r>
-              <a:rPr lang="en-US" sz="3550" b="1" dirty="0">
+              <a:rPr lang="en-US" sz="3600" dirty="0"/>
+              <a:t>със скоби (с</a:t>
+            </a:r>
+            <a:r>
+              <a:rPr lang="en-US" sz="3600" b="1" dirty="0">
                 <a:solidFill>
                   <a:schemeClr val="bg1"/>
                 </a:solidFill>
               </a:rPr>
-              <a:t>с влагане</a:t>
-            </a:r>
-            <a:r>
-              <a:rPr lang="en-US" sz="3550" dirty="0"/>
+              <a:t> влагане</a:t>
+            </a:r>
+            <a:r>
+              <a:rPr lang="en-US" sz="3600" dirty="0"/>
               <a:t>)</a:t>
             </a:r>
-            <a:endParaRPr lang="bg-BG" sz="3550" dirty="0"/>
+            <a:endParaRPr lang="bg-BG" sz="3600" dirty="0"/>
           </a:p>
           <a:p>
             <a:pPr marL="360045" indent="-360045">
@@ -23418,7 +23135,7 @@
               </a:buClr>
             </a:pPr>
             <a:r>
-              <a:rPr lang="en-US" sz="3550" b="1" dirty="0">
+              <a:rPr lang="en-US" sz="3600" b="1" dirty="0">
                 <a:solidFill>
                   <a:schemeClr val="bg1"/>
                 </a:solidFill>
@@ -23428,13 +23145,13 @@
               <a:t>Извлечете всички подизрази</a:t>
             </a:r>
             <a:r>
-              <a:rPr lang="en-US" sz="3550" dirty="0">
+              <a:rPr lang="en-US" sz="3600" dirty="0">
                 <a:ea typeface="+mn-lt"/>
                 <a:cs typeface="+mn-lt"/>
               </a:rPr>
               <a:t> в скоби</a:t>
             </a:r>
-            <a:endParaRPr lang="en-US" sz="3550" dirty="0">
+            <a:endParaRPr lang="en-US" sz="3600" dirty="0">
               <a:cs typeface="Calibri"/>
             </a:endParaRPr>
           </a:p>
@@ -24337,7 +24054,21 @@
                 <a:ea typeface="+mn-lt"/>
                 <a:cs typeface="+mn-lt"/>
               </a:rPr>
-              <a:t>Тествайте решението в Judge: </a:t>
+              <a:t>Тествайте решението </a:t>
+            </a:r>
+            <a:r>
+              <a:rPr lang="bg-BG" sz="1750" dirty="0">
+                <a:ea typeface="+mn-lt"/>
+                <a:cs typeface="+mn-lt"/>
+              </a:rPr>
+              <a:t>си </a:t>
+            </a:r>
+            <a:r>
+              <a:rPr lang="en-US" sz="1750" dirty="0">
+                <a:ea typeface="+mn-lt"/>
+                <a:cs typeface="+mn-lt"/>
+              </a:rPr>
+              <a:t>в Judge: </a:t>
             </a:r>
             <a:r>
               <a:rPr lang="en-US" sz="1750" u="sng" dirty="0">
@@ -24864,41 +24595,55 @@
           <a:lstStyle/>
           <a:p>
             <a:r>
-              <a:rPr lang="en-US" sz="3600" b="1" dirty="0">
+              <a:rPr lang="en-US" sz="3600" dirty="0">
                 <a:latin typeface="Consolas"/>
                 <a:cs typeface="Calibri"/>
               </a:rPr>
               <a:t>Enqueue()</a:t>
             </a:r>
             <a:r>
-              <a:rPr lang="bg-BG" sz="3600" b="1" dirty="0">
+              <a:rPr lang="bg-BG" sz="3600" dirty="0">
+                <a:latin typeface="Calibri" panose="020F0502020204030204" pitchFamily="34" charset="0"/>
+                <a:cs typeface="Calibri" panose="020F0502020204030204" pitchFamily="34" charset="0"/>
+              </a:rPr>
+              <a:t>,</a:t>
+            </a:r>
+            <a:r>
+              <a:rPr lang="bg-BG" sz="3600" dirty="0">
                 <a:latin typeface="Consolas"/>
                 <a:cs typeface="Calibri"/>
               </a:rPr>
-              <a:t>, </a:t>
-            </a:r>
-            <a:r>
-              <a:rPr lang="en-US" sz="3600" b="1" dirty="0">
+              <a:t> </a:t>
+            </a:r>
+            <a:r>
+              <a:rPr lang="en-US" sz="3600" dirty="0">
                 <a:latin typeface="Consolas"/>
                 <a:cs typeface="Calibri"/>
               </a:rPr>
-              <a:t>Dequeue() </a:t>
-            </a:r>
-            <a:r>
-              <a:rPr lang="bg-BG" sz="3600" b="1" dirty="0">
+              <a:t>Dequeue()</a:t>
+            </a:r>
+            <a:r>
+              <a:rPr lang="bg-BG" sz="3600" dirty="0">
+                <a:latin typeface="Calibri" panose="020F0502020204030204" pitchFamily="34" charset="0"/>
+                <a:cs typeface="Calibri" panose="020F0502020204030204" pitchFamily="34" charset="0"/>
+              </a:rPr>
+              <a:t>,</a:t>
+            </a:r>
+            <a:r>
+              <a:rPr lang="bg-BG" sz="3600" dirty="0">
                 <a:latin typeface="Consolas"/>
                 <a:cs typeface="Calibri"/>
               </a:rPr>
-              <a:t>, </a:t>
-            </a:r>
-            <a:r>
-              <a:rPr lang="en-US" sz="3600" b="1" dirty="0">
+              <a:t> </a:t>
+            </a:r>
+            <a:r>
+              <a:rPr lang="en-US" sz="3600" dirty="0">
                 <a:latin typeface="Consolas"/>
                 <a:cs typeface="Calibri"/>
               </a:rPr>
               <a:t>Peek()</a:t>
             </a:r>
-            <a:endParaRPr lang="en-US" sz="3600" b="1" dirty="0">
+            <a:endParaRPr lang="en-US" sz="3600" dirty="0">
               <a:latin typeface="Consolas"/>
             </a:endParaRPr>
           </a:p>
@@ -24926,9 +24671,14 @@
           <a:lstStyle/>
           <a:p>
             <a:r>
-              <a:rPr lang="en-GB" dirty="0"/>
-              <a:t>Общ преглед и работа с опашка</a:t>
-            </a:r>
+              <a:rPr lang="bg-BG" dirty="0"/>
+              <a:t>Опашка (</a:t>
+            </a:r>
+            <a:r>
+              <a:rPr lang="en-US" dirty="0"/>
+              <a:t>Queue)</a:t>
+            </a:r>
+            <a:endParaRPr lang="en-GB" dirty="0"/>
           </a:p>
         </p:txBody>
       </p:sp>
@@ -27629,7 +27379,7 @@
                                         <p:tgtEl>
                                           <p:spTgt spid="6">
                                             <p:txEl>
-                                              <p:pRg st="1" end="1"/>
+                                              <p:pRg st="3" end="3"/>
                                             </p:txEl>
                                           </p:spTgt>
                                         </p:tgtEl>
@@ -27658,7 +27408,7 @@
                                           </p:stCondLst>
                                         </p:cTn>
                                         <p:tgtEl>
-                                          <p:spTgt spid="15"/>
+                                          <p:spTgt spid="3"/>
                                         </p:tgtEl>
                                         <p:attrNameLst>
                                           <p:attrName>style.visibility</p:attrName>
@@ -27705,7 +27455,7 @@
                                         <p:tgtEl>
                                           <p:spTgt spid="6">
                                             <p:txEl>
-                                              <p:pRg st="3" end="3"/>
+                                              <p:pRg st="5" end="5"/>
                                             </p:txEl>
                                           </p:spTgt>
                                         </p:tgtEl>
@@ -27729,82 +27479,6 @@
                                     <p:set>
                                       <p:cBhvr>
                                         <p:cTn id="14" dur="1" fill="hold">
-                                          <p:stCondLst>
-                                            <p:cond delay="0"/>
-                                          </p:stCondLst>
-                                        </p:cTn>
-                                        <p:tgtEl>
-                                          <p:spTgt spid="3"/>
-                                        </p:tgtEl>
-                                        <p:attrNameLst>
-                                          <p:attrName>style.visibility</p:attrName>
-                                        </p:attrNameLst>
-                                      </p:cBhvr>
-                                      <p:to>
-                                        <p:strVal val="visible"/>
-                                      </p:to>
-                                    </p:set>
-                                  </p:childTnLst>
-                                </p:cTn>
-                              </p:par>
-                            </p:childTnLst>
-                          </p:cTn>
-                        </p:par>
-                      </p:childTnLst>
-                    </p:cTn>
-                  </p:par>
-                  <p:par>
-                    <p:cTn id="15" fill="hold">
-                      <p:stCondLst>
-                        <p:cond delay="indefinite"/>
-                      </p:stCondLst>
-                      <p:childTnLst>
-                        <p:par>
-                          <p:cTn id="16" fill="hold">
-                            <p:stCondLst>
-                              <p:cond delay="0"/>
-                            </p:stCondLst>
-                            <p:childTnLst>
-                              <p:par>
-                                <p:cTn id="17" presetID="1" presetClass="entr" presetSubtype="0" fill="hold" nodeType="clickEffect">
-                                  <p:stCondLst>
-                                    <p:cond delay="0"/>
-                                  </p:stCondLst>
-                                  <p:childTnLst>
-                                    <p:set>
-                                      <p:cBhvr>
-                                        <p:cTn id="18" dur="1" fill="hold">
-                                          <p:stCondLst>
-                                            <p:cond delay="0"/>
-                                          </p:stCondLst>
-                                        </p:cTn>
-                                        <p:tgtEl>
-                                          <p:spTgt spid="6">
-                                            <p:txEl>
-                                              <p:pRg st="5" end="5"/>
-                                            </p:txEl>
-                                          </p:spTgt>
-                                        </p:tgtEl>
-                                        <p:attrNameLst>
-                                          <p:attrName>style.visibility</p:attrName>
-                                        </p:attrNameLst>
-                                      </p:cBhvr>
-                                      <p:to>
-                                        <p:strVal val="visible"/>
-                                      </p:to>
-                                    </p:set>
-                                  </p:childTnLst>
-                                </p:cTn>
-                              </p:par>
-                              <p:par>
-                                <p:cTn id="19" presetID="1" presetClass="entr" presetSubtype="0" fill="hold" nodeType="withEffect">
-                                  <p:stCondLst>
-                                    <p:cond delay="0"/>
-                                  </p:stCondLst>
-                                  <p:childTnLst>
-                                    <p:set>
-                                      <p:cBhvr>
-                                        <p:cTn id="20" dur="1" fill="hold">
                                           <p:stCondLst>
                                             <p:cond delay="0"/>
                                           </p:stCondLst>
@@ -30226,7 +29900,12 @@
             <p:ph type="title"/>
           </p:nvPr>
         </p:nvSpPr>
-        <p:spPr/>
+        <p:spPr>
+          <a:xfrm>
+            <a:off x="111000" y="100750"/>
+            <a:ext cx="9910594" cy="882654"/>
+          </a:xfrm>
+        </p:spPr>
         <p:txBody>
           <a:bodyPr vert="horz" lIns="107972" tIns="35991" rIns="107972" bIns="35991" rtlCol="0" anchor="ctr" anchorCtr="0">
             <a:noAutofit/>
@@ -30239,20 +29918,20 @@
               </a:lnSpc>
             </a:pPr>
             <a:r>
-              <a:rPr lang="en-US" sz="3150" dirty="0">
+              <a:rPr lang="en-US" sz="3200" dirty="0">
                 <a:ea typeface="+mn-ea"/>
                 <a:cs typeface="Consolas" panose="020B0609020204030204" pitchFamily="49" charset="0"/>
               </a:rPr>
-              <a:t>Dequeue() –</a:t>
-            </a:r>
-            <a:r>
-              <a:rPr lang="en-US" sz="3150" dirty="0">
+              <a:t>Dequeue() – </a:t>
+            </a:r>
+            <a:r>
+              <a:rPr lang="en-US" sz="3200" dirty="0">
                 <a:ea typeface="+mn-ea"/>
                 <a:cs typeface="Calibri"/>
               </a:rPr>
               <a:t>Премахане и връщане на първия елемент</a:t>
             </a:r>
-            <a:endParaRPr lang="en-US" sz="3150" b="0" dirty="0">
+            <a:endParaRPr lang="en-US" sz="3200" b="0" dirty="0">
               <a:ea typeface="+mj-lt"/>
               <a:cs typeface="+mj-lt"/>
             </a:endParaRPr>
@@ -32013,7 +31692,12 @@
             <p:ph type="title"/>
           </p:nvPr>
         </p:nvSpPr>
-        <p:spPr/>
+        <p:spPr>
+          <a:xfrm>
+            <a:off x="111000" y="100750"/>
+            <a:ext cx="9715594" cy="882654"/>
+          </a:xfrm>
+        </p:spPr>
         <p:txBody>
           <a:bodyPr vert="horz" lIns="107972" tIns="35991" rIns="107972" bIns="35991" rtlCol="0" anchor="ctr" anchorCtr="0">
             <a:noAutofit/>
@@ -32026,20 +31710,34 @@
               </a:lnSpc>
             </a:pPr>
             <a:r>
-              <a:rPr lang="en-US" sz="3000" dirty="0">
+              <a:rPr lang="en-US" sz="3200" dirty="0">
                 <a:ea typeface="+mn-ea"/>
                 <a:cs typeface="Consolas" panose="020B0609020204030204" pitchFamily="49" charset="0"/>
               </a:rPr>
               <a:t>Peek() – </a:t>
             </a:r>
             <a:r>
-              <a:rPr lang="ru-RU" sz="3000" dirty="0">
+              <a:rPr lang="bg-BG" sz="3200" dirty="0">
                 <a:ea typeface="+mn-ea"/>
                 <a:cs typeface="Consolas" panose="020B0609020204030204" pitchFamily="49" charset="0"/>
               </a:rPr>
-              <a:t>Връща на първия елемент без да го премахва</a:t>
-            </a:r>
-            <a:endParaRPr lang="en-US" sz="3000" dirty="0">
+              <a:t>Връщане</a:t>
+            </a:r>
+            <a:r>
+              <a:rPr lang="ru-RU" sz="3200" dirty="0">
+                <a:ea typeface="+mn-ea"/>
+                <a:cs typeface="Consolas" panose="020B0609020204030204" pitchFamily="49" charset="0"/>
+              </a:rPr>
+              <a:t> на първия елемент без </a:t>
+            </a:r>
+            <a:r>
+              <a:rPr lang="bg-BG" sz="3200" dirty="0">
+                <a:ea typeface="+mn-ea"/>
+                <a:cs typeface="Consolas" panose="020B0609020204030204" pitchFamily="49" charset="0"/>
+              </a:rPr>
+              <a:t>премахване</a:t>
+            </a:r>
+            <a:endParaRPr lang="en-US" sz="3200" dirty="0">
               <a:ea typeface="+mn-ea"/>
               <a:cs typeface="Consolas" panose="020B0609020204030204" pitchFamily="49" charset="0"/>
             </a:endParaRPr>
@@ -32723,7 +32421,15 @@
             </a:r>
             <a:r>
               <a:rPr lang="en-US" sz="3600" dirty="0"/>
-              <a:t>картофа се </a:t>
+              <a:t>картоф</a:t>
+            </a:r>
+            <a:r>
+              <a:rPr lang="bg-BG" sz="3600" dirty="0"/>
+              <a:t>ът</a:t>
+            </a:r>
+            <a:r>
+              <a:rPr lang="en-US" sz="3600" dirty="0"/>
+              <a:t> се </a:t>
             </a:r>
             <a:r>
               <a:rPr lang="en-US" sz="3600" b="1" dirty="0">
@@ -32763,16 +32469,34 @@
               </a:buClr>
             </a:pPr>
             <a:r>
+              <a:rPr lang="bg-BG" sz="3600" dirty="0">
+                <a:cs typeface="Calibri"/>
+              </a:rPr>
+              <a:t>Принтирайте</a:t>
+            </a:r>
+            <a:r>
               <a:rPr lang="en-US" sz="3600" dirty="0">
                 <a:cs typeface="Calibri"/>
               </a:rPr>
-              <a:t>Принтирайте последното дет</a:t>
+              <a:t> </a:t>
             </a:r>
             <a:r>
               <a:rPr lang="bg-BG" sz="3600" dirty="0">
                 <a:cs typeface="Calibri"/>
               </a:rPr>
-              <a:t>е</a:t>
+              <a:t>последното</a:t>
+            </a:r>
+            <a:r>
+              <a:rPr lang="en-US" sz="3600" dirty="0">
+                <a:cs typeface="Calibri"/>
+              </a:rPr>
+              <a:t> </a:t>
+            </a:r>
+            <a:r>
+              <a:rPr lang="bg-BG" sz="3600" dirty="0">
+                <a:cs typeface="Calibri"/>
+              </a:rPr>
+              <a:t>дете:</a:t>
             </a:r>
             <a:endParaRPr lang="en-US" sz="3600" dirty="0">
               <a:cs typeface="Calibri"/>
@@ -33480,7 +33204,7 @@
           <a:p>
             <a:r>
               <a:rPr lang="bg-BG" dirty="0"/>
-              <a:t>Линейни структури от данни</a:t>
+              <a:t>Структури от данни</a:t>
             </a:r>
           </a:p>
         </p:txBody>
@@ -33541,11 +33265,11 @@
           <a:lstStyle/>
           <a:p>
             <a:r>
-              <a:rPr lang="en-US" sz="3950" dirty="0">
+              <a:rPr lang="bg-BG" sz="3950" dirty="0">
                 <a:ea typeface="+mj-lt"/>
                 <a:cs typeface="+mj-lt"/>
               </a:rPr>
-              <a:t>Задача</a:t>
+              <a:t>Решение</a:t>
             </a:r>
             <a:r>
               <a:rPr lang="en-US" sz="3950" dirty="0"/>
@@ -33940,13 +33664,13 @@
         </p:nvSpPr>
         <p:spPr bwMode="auto">
           <a:xfrm>
-            <a:off x="7602297" y="2983587"/>
-            <a:ext cx="3667592" cy="1367678"/>
+            <a:off x="7371741" y="2979000"/>
+            <a:ext cx="4748703" cy="855000"/>
           </a:xfrm>
           <a:prstGeom prst="wedgeRoundRectCallout">
             <a:avLst>
-              <a:gd name="adj1" fmla="val -37636"/>
-              <a:gd name="adj2" fmla="val -76984"/>
+              <a:gd name="adj1" fmla="val -27380"/>
+              <a:gd name="adj2" fmla="val -89772"/>
               <a:gd name="adj3" fmla="val 16667"/>
             </a:avLst>
           </a:prstGeom>
@@ -33999,7 +33723,7 @@
                 <a:ea typeface="+mn-lt"/>
                 <a:cs typeface="+mn-lt"/>
               </a:rPr>
-              <a:t>Копираме елементи от спец</a:t>
+              <a:t>Копираме елементи от </a:t>
             </a:r>
             <a:r>
               <a:rPr lang="bg-BG" sz="2350" b="1" dirty="0">
@@ -34009,7 +33733,7 @@
                 <a:ea typeface="+mn-lt"/>
                 <a:cs typeface="+mn-lt"/>
               </a:rPr>
-              <a:t>и</a:t>
+              <a:t>колекцията </a:t>
             </a:r>
             <a:r>
               <a:rPr lang="en-US" sz="2350" b="1" dirty="0">
@@ -34019,7 +33743,7 @@
                 <a:ea typeface="+mn-lt"/>
                 <a:cs typeface="+mn-lt"/>
               </a:rPr>
-              <a:t>фичната колекция и запазваме реда им </a:t>
+              <a:t>и запазваме реда им </a:t>
             </a:r>
             <a:endParaRPr lang="bg-BG" dirty="0"/>
           </a:p>
@@ -34081,7 +33805,7 @@
         </p:nvSpPr>
         <p:spPr>
           <a:xfrm>
-            <a:off x="763389" y="6344764"/>
+            <a:off x="763389" y="6434764"/>
             <a:ext cx="10589042" cy="369236"/>
           </a:xfrm>
           <a:prstGeom prst="rect">
@@ -34101,7 +33825,21 @@
                 <a:ea typeface="+mn-lt"/>
                 <a:cs typeface="+mn-lt"/>
               </a:rPr>
-              <a:t>Тествайте решението в Judge </a:t>
+              <a:t>Тествайте решението</a:t>
+            </a:r>
+            <a:r>
+              <a:rPr lang="bg-BG" sz="1800" dirty="0">
+                <a:ea typeface="+mn-lt"/>
+                <a:cs typeface="+mn-lt"/>
+              </a:rPr>
+              <a:t> си</a:t>
+            </a:r>
+            <a:r>
+              <a:rPr lang="en-US" sz="1800" dirty="0">
+                <a:ea typeface="+mn-lt"/>
+                <a:cs typeface="+mn-lt"/>
+              </a:rPr>
+              <a:t> в Judge </a:t>
             </a:r>
             <a:r>
               <a:rPr lang="en-US" sz="1799" dirty="0"/>
@@ -34622,31 +34360,6 @@
       </p:grpSpPr>
       <p:sp>
         <p:nvSpPr>
-          <p:cNvPr id="5" name="Текстов контейнер 4">
-            <a:extLst>
-              <a:ext uri="{FF2B5EF4-FFF2-40B4-BE49-F238E27FC236}">
-                <a16:creationId xmlns:a16="http://schemas.microsoft.com/office/drawing/2014/main" id="{C1D0597B-758C-4AFA-AAE8-A8D14382FAE4}"/>
-              </a:ext>
-            </a:extLst>
-          </p:cNvPr>
-          <p:cNvSpPr>
-            <a:spLocks noGrp="1"/>
-          </p:cNvSpPr>
-          <p:nvPr>
-            <p:ph type="body" sz="quarter" idx="10"/>
-          </p:nvPr>
-        </p:nvSpPr>
-        <p:spPr/>
-        <p:txBody>
-          <a:bodyPr/>
-          <a:lstStyle/>
-          <a:p>
-            <a:endParaRPr lang="bg-BG" dirty="0"/>
-          </a:p>
-        </p:txBody>
-      </p:sp>
-      <p:sp>
-        <p:nvSpPr>
           <p:cNvPr id="4" name="Title 3"/>
           <p:cNvSpPr>
             <a:spLocks noGrp="1"/>
@@ -34684,8 +34397,8 @@
         </p:nvSpPr>
         <p:spPr bwMode="auto">
           <a:xfrm>
-            <a:off x="2210812" y="1844906"/>
-            <a:ext cx="7770376" cy="2955339"/>
+            <a:off x="2001000" y="1539000"/>
+            <a:ext cx="8475188" cy="4498101"/>
           </a:xfrm>
           <a:prstGeom prst="rect">
             <a:avLst/>
@@ -34713,6 +34426,9 @@
           <a:lstStyle/>
           <a:p>
             <a:pPr eaLnBrk="0" hangingPunct="0">
+              <a:lnSpc>
+                <a:spcPct val="125000"/>
+              </a:lnSpc>
               <a:buClr>
                 <a:schemeClr val="accent5">
                   <a:lumMod val="40000"/>
@@ -34722,7 +34438,7 @@
               <a:buSzPct val="70000"/>
             </a:pPr>
             <a:r>
-              <a:rPr lang="en-US" sz="2799" b="1" noProof="1">
+              <a:rPr lang="en-US" sz="3100" b="1" noProof="1">
                 <a:latin typeface="Consolas" pitchFamily="49" charset="0"/>
                 <a:cs typeface="Consolas" pitchFamily="49" charset="0"/>
               </a:rPr>
@@ -34731,6 +34447,9 @@
           </a:p>
           <a:p>
             <a:pPr eaLnBrk="0" hangingPunct="0">
+              <a:lnSpc>
+                <a:spcPct val="125000"/>
+              </a:lnSpc>
               <a:buClr>
                 <a:schemeClr val="accent5">
                   <a:lumMod val="40000"/>
@@ -34740,7 +34459,7 @@
               <a:buSzPct val="70000"/>
             </a:pPr>
             <a:r>
-              <a:rPr lang="en-US" sz="2799" b="1" noProof="1">
+              <a:rPr lang="en-US" sz="3100" b="1" noProof="1">
                 <a:solidFill>
                   <a:schemeClr val="bg1"/>
                 </a:solidFill>
@@ -34750,14 +34469,14 @@
               <a:t>int</a:t>
             </a:r>
             <a:r>
-              <a:rPr lang="en-US" sz="2799" b="1" noProof="1">
+              <a:rPr lang="en-US" sz="3100" b="1" noProof="1">
                 <a:latin typeface="Consolas" pitchFamily="49" charset="0"/>
                 <a:cs typeface="Consolas" pitchFamily="49" charset="0"/>
               </a:rPr>
               <a:t> count = queue.</a:t>
             </a:r>
             <a:r>
-              <a:rPr lang="en-US" sz="2799" b="1" noProof="1">
+              <a:rPr lang="en-US" sz="3100" b="1" noProof="1">
                 <a:solidFill>
                   <a:schemeClr val="bg1"/>
                 </a:solidFill>
@@ -34767,7 +34486,7 @@
               <a:t>Count</a:t>
             </a:r>
             <a:r>
-              <a:rPr lang="en-US" sz="2799" b="1" noProof="1">
+              <a:rPr lang="en-US" sz="3100" b="1" noProof="1">
                 <a:latin typeface="Consolas" pitchFamily="49" charset="0"/>
                 <a:cs typeface="Consolas" pitchFamily="49" charset="0"/>
               </a:rPr>
@@ -34776,6 +34495,9 @@
           </a:p>
           <a:p>
             <a:pPr eaLnBrk="0" hangingPunct="0">
+              <a:lnSpc>
+                <a:spcPct val="125000"/>
+              </a:lnSpc>
               <a:buClr>
                 <a:schemeClr val="accent5">
                   <a:lumMod val="40000"/>
@@ -34785,7 +34507,7 @@
               <a:buSzPct val="70000"/>
             </a:pPr>
             <a:r>
-              <a:rPr lang="en-US" sz="2799" b="1" noProof="1">
+              <a:rPr lang="en-US" sz="3100" b="1" noProof="1">
                 <a:solidFill>
                   <a:schemeClr val="bg1"/>
                 </a:solidFill>
@@ -34795,14 +34517,14 @@
               <a:t>bool</a:t>
             </a:r>
             <a:r>
-              <a:rPr lang="en-US" sz="2799" b="1" noProof="1">
+              <a:rPr lang="en-US" sz="3100" b="1" noProof="1">
                 <a:latin typeface="Consolas" pitchFamily="49" charset="0"/>
                 <a:cs typeface="Consolas" pitchFamily="49" charset="0"/>
               </a:rPr>
               <a:t> exists = queue.</a:t>
             </a:r>
             <a:r>
-              <a:rPr lang="en-US" sz="2799" b="1" noProof="1">
+              <a:rPr lang="en-US" sz="3100" b="1" noProof="1">
                 <a:solidFill>
                   <a:schemeClr val="bg1"/>
                 </a:solidFill>
@@ -34812,14 +34534,14 @@
               <a:t>Contains(</a:t>
             </a:r>
             <a:r>
-              <a:rPr lang="en-US" sz="2799" b="1" noProof="1">
+              <a:rPr lang="en-US" sz="3100" b="1" noProof="1">
                 <a:latin typeface="Consolas" pitchFamily="49" charset="0"/>
                 <a:cs typeface="Consolas" pitchFamily="49" charset="0"/>
               </a:rPr>
               <a:t>2</a:t>
             </a:r>
             <a:r>
-              <a:rPr lang="en-US" sz="2799" b="1" noProof="1">
+              <a:rPr lang="en-US" sz="3100" b="1" noProof="1">
                 <a:solidFill>
                   <a:schemeClr val="bg1"/>
                 </a:solidFill>
@@ -34829,7 +34551,7 @@
               <a:t>)</a:t>
             </a:r>
             <a:r>
-              <a:rPr lang="en-US" sz="2799" b="1" noProof="1">
+              <a:rPr lang="en-US" sz="3100" b="1" noProof="1">
                 <a:latin typeface="Consolas" pitchFamily="49" charset="0"/>
                 <a:cs typeface="Consolas" pitchFamily="49" charset="0"/>
               </a:rPr>
@@ -34838,6 +34560,9 @@
           </a:p>
           <a:p>
             <a:pPr eaLnBrk="0" hangingPunct="0">
+              <a:lnSpc>
+                <a:spcPct val="125000"/>
+              </a:lnSpc>
               <a:buClr>
                 <a:schemeClr val="accent5">
                   <a:lumMod val="40000"/>
@@ -34847,7 +34572,7 @@
               <a:buSzPct val="70000"/>
             </a:pPr>
             <a:r>
-              <a:rPr lang="en-US" sz="2799" b="1" noProof="1">
+              <a:rPr lang="en-US" sz="3100" b="1" noProof="1">
                 <a:solidFill>
                   <a:schemeClr val="bg1"/>
                 </a:solidFill>
@@ -34857,14 +34582,14 @@
               <a:t>int[]</a:t>
             </a:r>
             <a:r>
-              <a:rPr lang="en-US" sz="2799" b="1" noProof="1">
+              <a:rPr lang="en-US" sz="3100" b="1" noProof="1">
                 <a:latin typeface="Consolas" pitchFamily="49" charset="0"/>
                 <a:cs typeface="Consolas" pitchFamily="49" charset="0"/>
               </a:rPr>
               <a:t> array = queue.</a:t>
             </a:r>
             <a:r>
-              <a:rPr lang="en-US" sz="2799" b="1" noProof="1">
+              <a:rPr lang="en-US" sz="3100" b="1" noProof="1">
                 <a:solidFill>
                   <a:schemeClr val="bg1"/>
                 </a:solidFill>
@@ -34874,7 +34599,7 @@
               <a:t>ToArray()</a:t>
             </a:r>
             <a:r>
-              <a:rPr lang="en-US" sz="2799" b="1" noProof="1">
+              <a:rPr lang="en-US" sz="3100" b="1" noProof="1">
                 <a:latin typeface="Consolas" pitchFamily="49" charset="0"/>
                 <a:cs typeface="Consolas" pitchFamily="49" charset="0"/>
               </a:rPr>
@@ -34883,6 +34608,9 @@
           </a:p>
           <a:p>
             <a:pPr eaLnBrk="0" hangingPunct="0">
+              <a:lnSpc>
+                <a:spcPct val="125000"/>
+              </a:lnSpc>
               <a:buClr>
                 <a:schemeClr val="accent5">
                   <a:lumMod val="40000"/>
@@ -34892,14 +34620,14 @@
               <a:buSzPct val="70000"/>
             </a:pPr>
             <a:r>
-              <a:rPr lang="en-US" sz="2799" b="1" noProof="1">
+              <a:rPr lang="en-US" sz="3100" b="1" noProof="1">
                 <a:latin typeface="Consolas" pitchFamily="49" charset="0"/>
                 <a:cs typeface="Consolas" pitchFamily="49" charset="0"/>
               </a:rPr>
               <a:t>queue.</a:t>
             </a:r>
             <a:r>
-              <a:rPr lang="en-US" sz="2799" b="1" noProof="1">
+              <a:rPr lang="en-US" sz="3100" b="1" noProof="1">
                 <a:solidFill>
                   <a:schemeClr val="bg1"/>
                 </a:solidFill>
@@ -34909,7 +34637,7 @@
               <a:t>Clear()</a:t>
             </a:r>
             <a:r>
-              <a:rPr lang="en-US" sz="2799" b="1" noProof="1">
+              <a:rPr lang="en-US" sz="3100" b="1" noProof="1">
                 <a:latin typeface="Consolas" pitchFamily="49" charset="0"/>
                 <a:cs typeface="Consolas" pitchFamily="49" charset="0"/>
               </a:rPr>
@@ -34918,6 +34646,9 @@
           </a:p>
           <a:p>
             <a:pPr eaLnBrk="0" hangingPunct="0">
+              <a:lnSpc>
+                <a:spcPct val="125000"/>
+              </a:lnSpc>
               <a:buClr>
                 <a:schemeClr val="accent5">
                   <a:lumMod val="40000"/>
@@ -34927,14 +34658,14 @@
               <a:buSzPct val="70000"/>
             </a:pPr>
             <a:r>
-              <a:rPr lang="en-US" sz="2799" b="1" noProof="1">
+              <a:rPr lang="en-US" sz="3100" b="1" noProof="1">
                 <a:latin typeface="Consolas" pitchFamily="49" charset="0"/>
                 <a:cs typeface="Consolas" pitchFamily="49" charset="0"/>
               </a:rPr>
               <a:t>queue.</a:t>
             </a:r>
             <a:r>
-              <a:rPr lang="en-US" sz="2799" b="1" noProof="1">
+              <a:rPr lang="en-US" sz="3100" b="1" noProof="1">
                 <a:solidFill>
                   <a:schemeClr val="bg1"/>
                 </a:solidFill>
@@ -34944,7 +34675,7 @@
               <a:t>TrimExcess()</a:t>
             </a:r>
             <a:r>
-              <a:rPr lang="en-US" sz="2799" b="1" noProof="1">
+              <a:rPr lang="en-US" sz="3100" b="1" noProof="1">
                 <a:latin typeface="Consolas" pitchFamily="49" charset="0"/>
                 <a:cs typeface="Consolas" pitchFamily="49" charset="0"/>
               </a:rPr>
@@ -34969,13 +34700,13 @@
         </p:nvSpPr>
         <p:spPr bwMode="auto">
           <a:xfrm>
-            <a:off x="9065227" y="3348537"/>
+            <a:off x="9246000" y="4323245"/>
             <a:ext cx="2609320" cy="880317"/>
           </a:xfrm>
           <a:prstGeom prst="wedgeRoundRectCallout">
             <a:avLst>
-              <a:gd name="adj1" fmla="val -72393"/>
-              <a:gd name="adj2" fmla="val -19189"/>
+              <a:gd name="adj1" fmla="val -65537"/>
+              <a:gd name="adj2" fmla="val -34995"/>
               <a:gd name="adj3" fmla="val 16667"/>
             </a:avLst>
           </a:prstGeom>
@@ -35021,14 +34752,14 @@
           <a:p>
             <a:pPr algn="ctr"/>
             <a:r>
-              <a:rPr lang="en-US" sz="2350" b="1" dirty="0">
+              <a:rPr lang="bg-BG" sz="2350" b="1" dirty="0">
                 <a:solidFill>
                   <a:schemeClr val="bg2"/>
                 </a:solidFill>
                 <a:ea typeface="+mn-lt"/>
                 <a:cs typeface="+mn-lt"/>
               </a:rPr>
-              <a:t>Запазва реда на елементите</a:t>
+              <a:t>Превръща опашката в масив</a:t>
             </a:r>
             <a:endParaRPr lang="bg-BG" b="1" dirty="0">
               <a:solidFill>
@@ -35055,13 +34786,13 @@
         </p:nvSpPr>
         <p:spPr bwMode="auto">
           <a:xfrm>
-            <a:off x="168331" y="4621095"/>
+            <a:off x="0" y="5785765"/>
             <a:ext cx="2556869" cy="1018235"/>
           </a:xfrm>
           <a:prstGeom prst="wedgeRoundRectCallout">
             <a:avLst>
-              <a:gd name="adj1" fmla="val 42656"/>
-              <a:gd name="adj2" fmla="val -108945"/>
+              <a:gd name="adj1" fmla="val 39545"/>
+              <a:gd name="adj2" fmla="val -120658"/>
               <a:gd name="adj3" fmla="val 16667"/>
             </a:avLst>
           </a:prstGeom>
@@ -35139,13 +34870,13 @@
         </p:nvSpPr>
         <p:spPr bwMode="auto">
           <a:xfrm>
-            <a:off x="4926305" y="4913614"/>
-            <a:ext cx="2789695" cy="1018235"/>
+            <a:off x="6802462" y="5421348"/>
+            <a:ext cx="4928838" cy="617652"/>
           </a:xfrm>
           <a:prstGeom prst="wedgeRoundRectCallout">
             <a:avLst>
-              <a:gd name="adj1" fmla="val -38004"/>
-              <a:gd name="adj2" fmla="val -85329"/>
+              <a:gd name="adj1" fmla="val -57768"/>
+              <a:gd name="adj2" fmla="val -25153"/>
               <a:gd name="adj3" fmla="val 16667"/>
             </a:avLst>
           </a:prstGeom>
@@ -35210,7 +34941,7 @@
               </a:rPr>
               <a:t> </a:t>
             </a:r>
-            <a:br>
+            <a:r>
               <a:rPr lang="bg-BG" sz="2350" b="1" dirty="0">
                 <a:solidFill>
                   <a:srgbClr val="FFFFFF"/>
@@ -35218,7 +34949,8 @@
                 <a:ea typeface="+mn-lt"/>
                 <a:cs typeface="+mn-lt"/>
               </a:rPr>
-            </a:br>
+              <a:t>вътрешния</a:t>
+            </a:r>
             <a:r>
               <a:rPr lang="en-US" sz="2350" b="1" dirty="0">
                 <a:solidFill>
@@ -35227,7 +34959,7 @@
                 <a:ea typeface="+mn-lt"/>
                 <a:cs typeface="+mn-lt"/>
               </a:rPr>
-              <a:t>вътрешния </a:t>
+              <a:t> </a:t>
             </a:r>
             <a:r>
               <a:rPr lang="bg-BG" sz="2350" b="1" dirty="0">
@@ -35287,6 +35019,178 @@
               <a:t>31</a:t>
             </a:fld>
             <a:endParaRPr lang="en-US" noProof="0" dirty="0"/>
+          </a:p>
+        </p:txBody>
+      </p:sp>
+      <p:sp>
+        <p:nvSpPr>
+          <p:cNvPr id="2" name="AutoShape 6">
+            <a:extLst>
+              <a:ext uri="{FF2B5EF4-FFF2-40B4-BE49-F238E27FC236}">
+                <a16:creationId xmlns:a16="http://schemas.microsoft.com/office/drawing/2014/main" id="{FD36E761-AC84-1139-FA51-987B1E6C7317}"/>
+              </a:ext>
+            </a:extLst>
+          </p:cNvPr>
+          <p:cNvSpPr>
+            <a:spLocks noChangeArrowheads="1"/>
+          </p:cNvSpPr>
+          <p:nvPr/>
+        </p:nvSpPr>
+        <p:spPr bwMode="auto">
+          <a:xfrm>
+            <a:off x="7446000" y="1707425"/>
+            <a:ext cx="4044443" cy="531011"/>
+          </a:xfrm>
+          <a:prstGeom prst="wedgeRoundRectCallout">
+            <a:avLst>
+              <a:gd name="adj1" fmla="val -60495"/>
+              <a:gd name="adj2" fmla="val 193896"/>
+              <a:gd name="adj3" fmla="val 16667"/>
+            </a:avLst>
+          </a:prstGeom>
+          <a:solidFill>
+            <a:schemeClr val="dk2">
+              <a:alpha val="80000"/>
+            </a:schemeClr>
+          </a:solidFill>
+          <a:ln w="19050">
+            <a:solidFill>
+              <a:schemeClr val="tx1">
+                <a:lumMod val="75000"/>
+                <a:alpha val="80000"/>
+              </a:schemeClr>
+            </a:solidFill>
+          </a:ln>
+          <a:effectLst/>
+        </p:spPr>
+        <p:style>
+          <a:lnRef idx="2">
+            <a:schemeClr val="accent1">
+              <a:shade val="50000"/>
+            </a:schemeClr>
+          </a:lnRef>
+          <a:fillRef idx="1001">
+            <a:schemeClr val="dk2"/>
+          </a:fillRef>
+          <a:effectRef idx="0">
+            <a:schemeClr val="accent1"/>
+          </a:effectRef>
+          <a:fontRef idx="minor">
+            <a:schemeClr val="lt1"/>
+          </a:fontRef>
+        </p:style>
+        <p:txBody>
+          <a:bodyPr rot="0" spcFirstLastPara="0" vertOverflow="overflow" horzOverflow="overflow" vert="horz" wrap="square" lIns="91416" tIns="45708" rIns="91416" bIns="45708" numCol="1" spcCol="0" rtlCol="0" fromWordArt="0" anchor="ctr" anchorCtr="0" forceAA="0" compatLnSpc="1">
+            <a:prstTxWarp prst="textNoShape">
+              <a:avLst/>
+            </a:prstTxWarp>
+            <a:noAutofit/>
+          </a:bodyPr>
+          <a:lstStyle/>
+          <a:p>
+            <a:pPr algn="ctr"/>
+            <a:r>
+              <a:rPr lang="bg-BG" sz="2350" b="1" dirty="0">
+                <a:solidFill>
+                  <a:schemeClr val="bg2"/>
+                </a:solidFill>
+                <a:ea typeface="+mn-lt"/>
+                <a:cs typeface="+mn-lt"/>
+              </a:rPr>
+              <a:t>Връща броя на елементите</a:t>
+            </a:r>
+            <a:endParaRPr lang="bg-BG" b="1" dirty="0">
+              <a:solidFill>
+                <a:schemeClr val="bg2"/>
+              </a:solidFill>
+              <a:cs typeface="Calibri"/>
+            </a:endParaRPr>
+          </a:p>
+        </p:txBody>
+      </p:sp>
+      <p:sp>
+        <p:nvSpPr>
+          <p:cNvPr id="6" name="AutoShape 6">
+            <a:extLst>
+              <a:ext uri="{FF2B5EF4-FFF2-40B4-BE49-F238E27FC236}">
+                <a16:creationId xmlns:a16="http://schemas.microsoft.com/office/drawing/2014/main" id="{F8D90340-38DB-A542-4BC6-E30BC8758694}"/>
+              </a:ext>
+            </a:extLst>
+          </p:cNvPr>
+          <p:cNvSpPr>
+            <a:spLocks noChangeArrowheads="1"/>
+          </p:cNvSpPr>
+          <p:nvPr/>
+        </p:nvSpPr>
+        <p:spPr bwMode="auto">
+          <a:xfrm>
+            <a:off x="8391000" y="2619000"/>
+            <a:ext cx="3711000" cy="860036"/>
+          </a:xfrm>
+          <a:prstGeom prst="wedgeRoundRectCallout">
+            <a:avLst>
+              <a:gd name="adj1" fmla="val -39436"/>
+              <a:gd name="adj2" fmla="val 66533"/>
+              <a:gd name="adj3" fmla="val 16667"/>
+            </a:avLst>
+          </a:prstGeom>
+          <a:solidFill>
+            <a:schemeClr val="dk2">
+              <a:alpha val="80000"/>
+            </a:schemeClr>
+          </a:solidFill>
+          <a:ln w="19050">
+            <a:solidFill>
+              <a:schemeClr val="tx1">
+                <a:lumMod val="75000"/>
+                <a:alpha val="80000"/>
+              </a:schemeClr>
+            </a:solidFill>
+          </a:ln>
+          <a:effectLst/>
+        </p:spPr>
+        <p:style>
+          <a:lnRef idx="2">
+            <a:schemeClr val="accent1">
+              <a:shade val="50000"/>
+            </a:schemeClr>
+          </a:lnRef>
+          <a:fillRef idx="1001">
+            <a:schemeClr val="dk2"/>
+          </a:fillRef>
+          <a:effectRef idx="0">
+            <a:schemeClr val="accent1"/>
+          </a:effectRef>
+          <a:fontRef idx="minor">
+            <a:schemeClr val="lt1"/>
+          </a:fontRef>
+        </p:style>
+        <p:txBody>
+          <a:bodyPr rot="0" spcFirstLastPara="0" vertOverflow="overflow" horzOverflow="overflow" vert="horz" wrap="square" lIns="91416" tIns="45708" rIns="91416" bIns="45708" numCol="1" spcCol="0" rtlCol="0" fromWordArt="0" anchor="ctr" anchorCtr="0" forceAA="0" compatLnSpc="1">
+            <a:prstTxWarp prst="textNoShape">
+              <a:avLst/>
+            </a:prstTxWarp>
+            <a:noAutofit/>
+          </a:bodyPr>
+          <a:lstStyle/>
+          <a:p>
+            <a:pPr algn="ctr"/>
+            <a:r>
+              <a:rPr lang="bg-BG" sz="2350" b="1" dirty="0">
+                <a:solidFill>
+                  <a:schemeClr val="bg2"/>
+                </a:solidFill>
+                <a:ea typeface="+mn-lt"/>
+                <a:cs typeface="+mn-lt"/>
+              </a:rPr>
+              <a:t>Проверява дали опашката съдържа елемента</a:t>
+            </a:r>
+            <a:endParaRPr lang="bg-BG" b="1" dirty="0">
+              <a:solidFill>
+                <a:schemeClr val="bg2"/>
+              </a:solidFill>
+              <a:cs typeface="Calibri"/>
+            </a:endParaRPr>
           </a:p>
         </p:txBody>
       </p:sp>
@@ -35329,7 +35233,7 @@
                             </p:stCondLst>
                             <p:childTnLst>
                               <p:par>
-                                <p:cTn id="5" presetID="1" presetClass="entr" presetSubtype="0" fill="hold" nodeType="clickEffect">
+                                <p:cTn id="5" presetID="1" presetClass="entr" presetSubtype="0" fill="hold" grpId="0" nodeType="clickEffect">
                                   <p:stCondLst>
                                     <p:cond delay="0"/>
                                   </p:stCondLst>
@@ -35342,11 +35246,7 @@
                                           </p:stCondLst>
                                         </p:cTn>
                                         <p:tgtEl>
-                                          <p:spTgt spid="20">
-                                            <p:txEl>
-                                              <p:pRg st="2" end="2"/>
-                                            </p:txEl>
-                                          </p:spTgt>
+                                          <p:spTgt spid="2"/>
                                         </p:tgtEl>
                                         <p:attrNameLst>
                                           <p:attrName>style.visibility</p:attrName>
@@ -35359,39 +35259,26 @@
                                   </p:childTnLst>
                                 </p:cTn>
                               </p:par>
+                            </p:childTnLst>
+                          </p:cTn>
+                        </p:par>
+                      </p:childTnLst>
+                    </p:cTn>
+                  </p:par>
+                  <p:par>
+                    <p:cTn id="7" fill="hold">
+                      <p:stCondLst>
+                        <p:cond delay="indefinite"/>
+                      </p:stCondLst>
+                      <p:childTnLst>
+                        <p:par>
+                          <p:cTn id="8" fill="hold">
+                            <p:stCondLst>
+                              <p:cond delay="0"/>
+                            </p:stCondLst>
+                            <p:childTnLst>
                               <p:par>
-                                <p:cTn id="7" presetID="1" presetClass="entr" presetSubtype="0" fill="hold" nodeType="withEffect">
-                                  <p:stCondLst>
-                                    <p:cond delay="0"/>
-                                  </p:stCondLst>
-                                  <p:childTnLst>
-                                    <p:set>
-                                      <p:cBhvr>
-                                        <p:cTn id="8" dur="1" fill="hold">
-                                          <p:stCondLst>
-                                            <p:cond delay="0"/>
-                                          </p:stCondLst>
-                                        </p:cTn>
-                                        <p:tgtEl>
-                                          <p:spTgt spid="20">
-                                            <p:txEl>
-                                              <p:pRg st="3" end="3"/>
-                                            </p:txEl>
-                                          </p:spTgt>
-                                        </p:tgtEl>
-                                        <p:attrNameLst>
-                                          <p:attrName>style.visibility</p:attrName>
-                                        </p:attrNameLst>
-                                      </p:cBhvr>
-                                      <p:to>
-                                        <p:strVal val="visible"/>
-                                      </p:to>
-                                    </p:set>
-                                  </p:childTnLst>
-                                </p:cTn>
-                              </p:par>
-                              <p:par>
-                                <p:cTn id="9" presetID="1" presetClass="entr" presetSubtype="0" fill="hold" grpId="0" nodeType="withEffect">
+                                <p:cTn id="9" presetID="1" presetClass="entr" presetSubtype="0" fill="hold" nodeType="clickEffect">
                                   <p:stCondLst>
                                     <p:cond delay="0"/>
                                   </p:stCondLst>
@@ -35404,7 +35291,11 @@
                                           </p:stCondLst>
                                         </p:cTn>
                                         <p:tgtEl>
-                                          <p:spTgt spid="8"/>
+                                          <p:spTgt spid="20">
+                                            <p:txEl>
+                                              <p:pRg st="2" end="2"/>
+                                            </p:txEl>
+                                          </p:spTgt>
                                         </p:tgtEl>
                                         <p:attrNameLst>
                                           <p:attrName>style.visibility</p:attrName>
@@ -35436,7 +35327,7 @@
                             </p:stCondLst>
                             <p:childTnLst>
                               <p:par>
-                                <p:cTn id="13" presetID="1" presetClass="entr" presetSubtype="0" fill="hold" nodeType="clickEffect">
+                                <p:cTn id="13" presetID="1" presetClass="entr" presetSubtype="0" fill="hold" grpId="0" nodeType="clickEffect">
                                   <p:stCondLst>
                                     <p:cond delay="0"/>
                                   </p:stCondLst>
@@ -35444,6 +35335,145 @@
                                     <p:set>
                                       <p:cBhvr>
                                         <p:cTn id="14" dur="1" fill="hold">
+                                          <p:stCondLst>
+                                            <p:cond delay="0"/>
+                                          </p:stCondLst>
+                                        </p:cTn>
+                                        <p:tgtEl>
+                                          <p:spTgt spid="6"/>
+                                        </p:tgtEl>
+                                        <p:attrNameLst>
+                                          <p:attrName>style.visibility</p:attrName>
+                                        </p:attrNameLst>
+                                      </p:cBhvr>
+                                      <p:to>
+                                        <p:strVal val="visible"/>
+                                      </p:to>
+                                    </p:set>
+                                  </p:childTnLst>
+                                </p:cTn>
+                              </p:par>
+                            </p:childTnLst>
+                          </p:cTn>
+                        </p:par>
+                      </p:childTnLst>
+                    </p:cTn>
+                  </p:par>
+                  <p:par>
+                    <p:cTn id="15" fill="hold">
+                      <p:stCondLst>
+                        <p:cond delay="indefinite"/>
+                      </p:stCondLst>
+                      <p:childTnLst>
+                        <p:par>
+                          <p:cTn id="16" fill="hold">
+                            <p:stCondLst>
+                              <p:cond delay="0"/>
+                            </p:stCondLst>
+                            <p:childTnLst>
+                              <p:par>
+                                <p:cTn id="17" presetID="1" presetClass="entr" presetSubtype="0" fill="hold" nodeType="clickEffect">
+                                  <p:stCondLst>
+                                    <p:cond delay="0"/>
+                                  </p:stCondLst>
+                                  <p:childTnLst>
+                                    <p:set>
+                                      <p:cBhvr>
+                                        <p:cTn id="18" dur="1" fill="hold">
+                                          <p:stCondLst>
+                                            <p:cond delay="0"/>
+                                          </p:stCondLst>
+                                        </p:cTn>
+                                        <p:tgtEl>
+                                          <p:spTgt spid="20">
+                                            <p:txEl>
+                                              <p:pRg st="3" end="3"/>
+                                            </p:txEl>
+                                          </p:spTgt>
+                                        </p:tgtEl>
+                                        <p:attrNameLst>
+                                          <p:attrName>style.visibility</p:attrName>
+                                        </p:attrNameLst>
+                                      </p:cBhvr>
+                                      <p:to>
+                                        <p:strVal val="visible"/>
+                                      </p:to>
+                                    </p:set>
+                                  </p:childTnLst>
+                                </p:cTn>
+                              </p:par>
+                            </p:childTnLst>
+                          </p:cTn>
+                        </p:par>
+                      </p:childTnLst>
+                    </p:cTn>
+                  </p:par>
+                  <p:par>
+                    <p:cTn id="19" fill="hold">
+                      <p:stCondLst>
+                        <p:cond delay="indefinite"/>
+                      </p:stCondLst>
+                      <p:childTnLst>
+                        <p:par>
+                          <p:cTn id="20" fill="hold">
+                            <p:stCondLst>
+                              <p:cond delay="0"/>
+                            </p:stCondLst>
+                            <p:childTnLst>
+                              <p:par>
+                                <p:cTn id="21" presetID="1" presetClass="entr" presetSubtype="0" fill="hold" grpId="0" nodeType="clickEffect">
+                                  <p:stCondLst>
+                                    <p:cond delay="0"/>
+                                  </p:stCondLst>
+                                  <p:childTnLst>
+                                    <p:set>
+                                      <p:cBhvr>
+                                        <p:cTn id="22" dur="1" fill="hold">
+                                          <p:stCondLst>
+                                            <p:cond delay="0"/>
+                                          </p:stCondLst>
+                                        </p:cTn>
+                                        <p:tgtEl>
+                                          <p:spTgt spid="8"/>
+                                        </p:tgtEl>
+                                        <p:attrNameLst>
+                                          <p:attrName>style.visibility</p:attrName>
+                                        </p:attrNameLst>
+                                      </p:cBhvr>
+                                      <p:to>
+                                        <p:strVal val="visible"/>
+                                      </p:to>
+                                    </p:set>
+                                  </p:childTnLst>
+                                </p:cTn>
+                              </p:par>
+                            </p:childTnLst>
+                          </p:cTn>
+                        </p:par>
+                      </p:childTnLst>
+                    </p:cTn>
+                  </p:par>
+                  <p:par>
+                    <p:cTn id="23" fill="hold">
+                      <p:stCondLst>
+                        <p:cond delay="indefinite"/>
+                      </p:stCondLst>
+                      <p:childTnLst>
+                        <p:par>
+                          <p:cTn id="24" fill="hold">
+                            <p:stCondLst>
+                              <p:cond delay="0"/>
+                            </p:stCondLst>
+                            <p:childTnLst>
+                              <p:par>
+                                <p:cTn id="25" presetID="1" presetClass="entr" presetSubtype="0" fill="hold" nodeType="clickEffect">
+                                  <p:stCondLst>
+                                    <p:cond delay="0"/>
+                                  </p:stCondLst>
+                                  <p:childTnLst>
+                                    <p:set>
+                                      <p:cBhvr>
+                                        <p:cTn id="26" dur="1" fill="hold">
                                           <p:stCondLst>
                                             <p:cond delay="0"/>
                                           </p:stCondLst>
@@ -35466,15 +35496,33 @@
                                   </p:childTnLst>
                                 </p:cTn>
                               </p:par>
+                            </p:childTnLst>
+                          </p:cTn>
+                        </p:par>
+                      </p:childTnLst>
+                    </p:cTn>
+                  </p:par>
+                  <p:par>
+                    <p:cTn id="27" fill="hold">
+                      <p:stCondLst>
+                        <p:cond delay="indefinite"/>
+                      </p:stCondLst>
+                      <p:childTnLst>
+                        <p:par>
+                          <p:cTn id="28" fill="hold">
+                            <p:stCondLst>
+                              <p:cond delay="0"/>
+                            </p:stCondLst>
+                            <p:childTnLst>
                               <p:par>
-                                <p:cTn id="15" presetID="1" presetClass="entr" presetSubtype="0" fill="hold" grpId="0" nodeType="withEffect">
+                                <p:cTn id="29" presetID="1" presetClass="entr" presetSubtype="0" fill="hold" grpId="0" nodeType="clickEffect">
                                   <p:stCondLst>
                                     <p:cond delay="0"/>
                                   </p:stCondLst>
                                   <p:childTnLst>
                                     <p:set>
                                       <p:cBhvr>
-                                        <p:cTn id="16" dur="1" fill="hold">
+                                        <p:cTn id="30" dur="1" fill="hold">
                                           <p:stCondLst>
                                             <p:cond delay="0"/>
                                           </p:stCondLst>
@@ -35500,26 +35548,26 @@
                     </p:cTn>
                   </p:par>
                   <p:par>
-                    <p:cTn id="17" fill="hold">
+                    <p:cTn id="31" fill="hold">
                       <p:stCondLst>
                         <p:cond delay="indefinite"/>
                       </p:stCondLst>
                       <p:childTnLst>
                         <p:par>
-                          <p:cTn id="18" fill="hold">
+                          <p:cTn id="32" fill="hold">
                             <p:stCondLst>
                               <p:cond delay="0"/>
                             </p:stCondLst>
                             <p:childTnLst>
                               <p:par>
-                                <p:cTn id="19" presetID="1" presetClass="entr" presetSubtype="0" fill="hold" nodeType="clickEffect">
+                                <p:cTn id="33" presetID="1" presetClass="entr" presetSubtype="0" fill="hold" nodeType="clickEffect">
                                   <p:stCondLst>
                                     <p:cond delay="0"/>
                                   </p:stCondLst>
                                   <p:childTnLst>
                                     <p:set>
                                       <p:cBhvr>
-                                        <p:cTn id="20" dur="1" fill="hold">
+                                        <p:cTn id="34" dur="1" fill="hold">
                                           <p:stCondLst>
                                             <p:cond delay="0"/>
                                           </p:stCondLst>
@@ -35542,15 +35590,33 @@
                                   </p:childTnLst>
                                 </p:cTn>
                               </p:par>
+                            </p:childTnLst>
+                          </p:cTn>
+                        </p:par>
+                      </p:childTnLst>
+                    </p:cTn>
+                  </p:par>
+                  <p:par>
+                    <p:cTn id="35" fill="hold">
+                      <p:stCondLst>
+                        <p:cond delay="indefinite"/>
+                      </p:stCondLst>
+                      <p:childTnLst>
+                        <p:par>
+                          <p:cTn id="36" fill="hold">
+                            <p:stCondLst>
+                              <p:cond delay="0"/>
+                            </p:stCondLst>
+                            <p:childTnLst>
                               <p:par>
-                                <p:cTn id="21" presetID="1" presetClass="entr" presetSubtype="0" fill="hold" grpId="0" nodeType="withEffect">
+                                <p:cTn id="37" presetID="1" presetClass="entr" presetSubtype="0" fill="hold" grpId="0" nodeType="clickEffect">
                                   <p:stCondLst>
                                     <p:cond delay="0"/>
                                   </p:stCondLst>
                                   <p:childTnLst>
                                     <p:set>
                                       <p:cBhvr>
-                                        <p:cTn id="22" dur="1" fill="hold">
+                                        <p:cTn id="38" dur="1" fill="hold">
                                           <p:stCondLst>
                                             <p:cond delay="0"/>
                                           </p:stCondLst>
@@ -35600,6 +35666,8 @@
       <p:bldP spid="8" grpId="0" animBg="1"/>
       <p:bldP spid="9" grpId="0" animBg="1"/>
       <p:bldP spid="10" grpId="0" animBg="1"/>
+      <p:bldP spid="2" grpId="0" animBg="1"/>
+      <p:bldP spid="6" grpId="0" animBg="1"/>
     </p:bldLst>
   </p:timing>
 </p:sld>
@@ -36697,27 +36765,7 @@
                 <a:latin typeface="Consolas"/>
                 <a:cs typeface="Consolas" pitchFamily="49" charset="0"/>
               </a:rPr>
-              <a:t>// </a:t>
-            </a:r>
-            <a:r>
-              <a:rPr lang="en-US" sz="2550" b="1" noProof="1">
-                <a:solidFill>
-                  <a:schemeClr val="accent2"/>
-                </a:solidFill>
-                <a:latin typeface="Consolas"/>
-                <a:cs typeface="Consolas" pitchFamily="49" charset="0"/>
-              </a:rPr>
-              <a:t>TODO:</a:t>
-            </a:r>
-            <a:r>
-              <a:rPr lang="en-US" sz="2550" b="1" i="1" noProof="1">
-                <a:solidFill>
-                  <a:schemeClr val="accent2"/>
-                </a:solidFill>
-                <a:latin typeface="Consolas"/>
-                <a:cs typeface="Consolas" pitchFamily="49" charset="0"/>
-              </a:rPr>
-              <a:t> Добавете логика за зелена светлина</a:t>
+              <a:t>// TODO: Добавете логика за зелена светлина</a:t>
             </a:r>
           </a:p>
           <a:p>
@@ -36921,7 +36969,21 @@
                 <a:ea typeface="+mn-lt"/>
                 <a:cs typeface="+mn-lt"/>
               </a:rPr>
-              <a:t>Тествайте решението в Judge: </a:t>
+              <a:t>Тествайте решението</a:t>
+            </a:r>
+            <a:r>
+              <a:rPr lang="bg-BG" sz="1750" dirty="0">
+                <a:ea typeface="+mn-lt"/>
+                <a:cs typeface="+mn-lt"/>
+              </a:rPr>
+              <a:t> си</a:t>
+            </a:r>
+            <a:r>
+              <a:rPr lang="en-US" sz="1750" dirty="0">
+                <a:ea typeface="+mn-lt"/>
+                <a:cs typeface="+mn-lt"/>
+              </a:rPr>
+              <a:t> в Judge: </a:t>
             </a:r>
             <a:r>
               <a:rPr lang="en-US" sz="1750" u="sng" dirty="0">
@@ -36932,6 +36994,72 @@
             <a:endParaRPr lang="en-US" sz="1750" dirty="0">
               <a:cs typeface="Calibri"/>
             </a:endParaRPr>
+          </a:p>
+        </p:txBody>
+      </p:sp>
+      <p:sp>
+        <p:nvSpPr>
+          <p:cNvPr id="2" name="TextBox 1">
+            <a:extLst>
+              <a:ext uri="{FF2B5EF4-FFF2-40B4-BE49-F238E27FC236}">
+                <a16:creationId xmlns:a16="http://schemas.microsoft.com/office/drawing/2014/main" id="{65B90CC7-EB9A-C30C-E92A-A192B0E27F1E}"/>
+              </a:ext>
+            </a:extLst>
+          </p:cNvPr>
+          <p:cNvSpPr txBox="1"/>
+          <p:nvPr/>
+        </p:nvSpPr>
+        <p:spPr>
+          <a:xfrm>
+            <a:off x="7041000" y="1944000"/>
+            <a:ext cx="4494444" cy="861362"/>
+          </a:xfrm>
+          <a:prstGeom prst="rect">
+            <a:avLst/>
+          </a:prstGeom>
+          <a:ln/>
+        </p:spPr>
+        <p:style>
+          <a:lnRef idx="2">
+            <a:schemeClr val="accent2"/>
+          </a:lnRef>
+          <a:fillRef idx="1">
+            <a:schemeClr val="lt1"/>
+          </a:fillRef>
+          <a:effectRef idx="0">
+            <a:schemeClr val="accent2"/>
+          </a:effectRef>
+          <a:fontRef idx="minor">
+            <a:schemeClr val="dk1"/>
+          </a:fontRef>
+        </p:style>
+        <p:txBody>
+          <a:bodyPr vert="horz" wrap="square" lIns="144000" tIns="108000" rIns="144000" bIns="108000" rtlCol="0">
+            <a:spAutoFit/>
+          </a:bodyPr>
+          <a:lstStyle/>
+          <a:p>
+            <a:pPr algn="l" eaLnBrk="0" hangingPunct="0">
+              <a:lnSpc>
+                <a:spcPct val="110000"/>
+              </a:lnSpc>
+              <a:buClr>
+                <a:schemeClr val="accent5">
+                  <a:lumMod val="40000"/>
+                  <a:lumOff val="60000"/>
+                </a:schemeClr>
+              </a:buClr>
+              <a:buSzPct val="70000"/>
+            </a:pPr>
+            <a:r>
+              <a:rPr lang="bg-BG" sz="4000" dirty="0" err="1"/>
+              <a:t>T</a:t>
+            </a:r>
+            <a:r>
+              <a:rPr lang="en-US" sz="4000" dirty="0"/>
+              <a:t>ODO: Fix Judge link</a:t>
+            </a:r>
+            <a:endParaRPr lang="en-BG" sz="4000" dirty="0"/>
           </a:p>
         </p:txBody>
       </p:sp>
@@ -37654,7 +37782,7 @@
         </p:spPr>
         <p:txBody>
           <a:bodyPr vert="horz" lIns="107972" tIns="35991" rIns="107972" bIns="35991" rtlCol="0" anchor="t">
-            <a:normAutofit lnSpcReduction="10000"/>
+            <a:normAutofit/>
           </a:bodyPr>
           <a:lstStyle>
             <a:lvl1pPr marL="456915" indent="-456915" algn="l" defTabSz="1218438" rtl="0" eaLnBrk="1" latinLnBrk="1" hangingPunct="1">
@@ -37838,7 +37966,23 @@
                   <a:schemeClr val="bg2"/>
                 </a:solidFill>
               </a:rPr>
-              <a:t>Линейната структура от данни съдържа редица </a:t>
+              <a:t>Линейната структура от данни </a:t>
+            </a:r>
+            <a:r>
+              <a:rPr lang="en-US" sz="3800" dirty="0">
+                <a:solidFill>
+                  <a:schemeClr val="bg2"/>
+                </a:solidFill>
+              </a:rPr>
+              <a:t>== </a:t>
+            </a:r>
+            <a:r>
+              <a:rPr lang="bg-BG" sz="3800" dirty="0">
+                <a:solidFill>
+                  <a:schemeClr val="bg2"/>
+                </a:solidFill>
+              </a:rPr>
+              <a:t>поредица </a:t>
             </a:r>
             <a:br>
               <a:rPr lang="bg-BG" sz="3800" dirty="0">
@@ -37857,7 +38001,7 @@
             </a:r>
           </a:p>
           <a:p>
-            <a:pPr marL="456565" indent="-456565">
+            <a:pPr marL="989631" lvl="1" indent="-456565">
               <a:lnSpc>
                 <a:spcPct val="100000"/>
               </a:lnSpc>
@@ -37866,7 +38010,7 @@
               </a:buClr>
             </a:pPr>
             <a:r>
-              <a:rPr lang="en-US" sz="3800" b="1" dirty="0">
+              <a:rPr lang="en-US" sz="3600" b="1" dirty="0">
                 <a:solidFill>
                   <a:schemeClr val="bg1">
                     <a:lumMod val="60000"/>
@@ -37876,7 +38020,7 @@
               </a:rPr>
               <a:t>Stack&lt;T&gt;</a:t>
             </a:r>
-            <a:endParaRPr lang="en-US" sz="3800" b="1" dirty="0">
+            <a:endParaRPr lang="en-US" sz="3600" b="1" dirty="0">
               <a:solidFill>
                 <a:schemeClr val="bg1">
                   <a:lumMod val="60000"/>
@@ -37887,7 +38031,7 @@
             </a:endParaRPr>
           </a:p>
           <a:p>
-            <a:pPr marL="989965" lvl="1" indent="-380365">
+            <a:pPr marL="989631" lvl="1" indent="-456565">
               <a:lnSpc>
                 <a:spcPct val="100000"/>
               </a:lnSpc>
@@ -37896,33 +38040,7 @@
               </a:buClr>
             </a:pPr>
             <a:r>
-              <a:rPr lang="en-US" sz="3600" dirty="0">
-                <a:solidFill>
-                  <a:schemeClr val="bg2"/>
-                </a:solidFill>
-                <a:ea typeface="+mn-lt"/>
-                <a:cs typeface="+mn-lt"/>
-              </a:rPr>
-              <a:t>Вкаран последен, първи изкаран</a:t>
-            </a:r>
-            <a:endParaRPr lang="en-GB" sz="3600" dirty="0">
-              <a:solidFill>
-                <a:schemeClr val="bg2"/>
-              </a:solidFill>
-              <a:cs typeface="Calibri"/>
-            </a:endParaRPr>
-          </a:p>
-          <a:p>
-            <a:pPr marL="456565" indent="-456565">
-              <a:lnSpc>
-                <a:spcPct val="100000"/>
-              </a:lnSpc>
-              <a:buClr>
-                <a:schemeClr val="bg2"/>
-              </a:buClr>
-            </a:pPr>
-            <a:r>
-              <a:rPr lang="en-US" sz="3800" b="1" dirty="0">
+              <a:rPr lang="en-US" sz="3600" b="1" dirty="0">
                 <a:solidFill>
                   <a:schemeClr val="bg1">
                     <a:lumMod val="60000"/>
@@ -37932,36 +38050,12 @@
               </a:rPr>
               <a:t>Queue&lt;T&gt;</a:t>
             </a:r>
-            <a:endParaRPr lang="en-US" sz="3800" b="1" dirty="0">
+            <a:endParaRPr lang="en-US" sz="3600" b="1" dirty="0">
               <a:solidFill>
                 <a:schemeClr val="bg1">
                   <a:lumMod val="60000"/>
                   <a:lumOff val="40000"/>
                 </a:schemeClr>
-              </a:solidFill>
-              <a:cs typeface="Calibri"/>
-            </a:endParaRPr>
-          </a:p>
-          <a:p>
-            <a:pPr marL="989965" lvl="1" indent="-380365">
-              <a:lnSpc>
-                <a:spcPct val="100000"/>
-              </a:lnSpc>
-              <a:buClr>
-                <a:schemeClr val="bg2"/>
-              </a:buClr>
-            </a:pPr>
-            <a:r>
-              <a:rPr lang="en-US" sz="3600" dirty="0">
-                <a:solidFill>
-                  <a:schemeClr val="bg2"/>
-                </a:solidFill>
-              </a:rPr>
-              <a:t>Вкаран първи, първи изкаран</a:t>
-            </a:r>
-            <a:endParaRPr lang="en-US" sz="3600" dirty="0">
-              <a:solidFill>
-                <a:schemeClr val="bg2"/>
               </a:solidFill>
               <a:cs typeface="Calibri"/>
             </a:endParaRPr>
@@ -38095,7 +38189,7 @@
                                         <p:tgtEl>
                                           <p:spTgt spid="15">
                                             <p:txEl>
-                                              <p:pRg st="1" end="1"/>
+                                              <p:pRg st="2" end="2"/>
                                             </p:txEl>
                                           </p:spTgt>
                                         </p:tgtEl>
@@ -38144,154 +38238,7 @@
                                         <p:tgtEl>
                                           <p:spTgt spid="15">
                                             <p:txEl>
-                                              <p:pRg st="2" end="2"/>
-                                            </p:txEl>
-                                          </p:spTgt>
-                                        </p:tgtEl>
-                                        <p:attrNameLst>
-                                          <p:attrName>style.visibility</p:attrName>
-                                        </p:attrNameLst>
-                                      </p:cBhvr>
-                                      <p:to>
-                                        <p:strVal val="visible"/>
-                                      </p:to>
-                                    </p:set>
-                                  </p:childTnLst>
-                                </p:cTn>
-                              </p:par>
-                            </p:childTnLst>
-                          </p:cTn>
-                        </p:par>
-                      </p:childTnLst>
-                    </p:cTn>
-                  </p:par>
-                  <p:par>
-                    <p:cTn id="11" fill="hold">
-                      <p:stCondLst>
-                        <p:cond delay="indefinite"/>
-                      </p:stCondLst>
-                      <p:childTnLst>
-                        <p:par>
-                          <p:cTn id="12" fill="hold">
-                            <p:stCondLst>
-                              <p:cond delay="0"/>
-                            </p:stCondLst>
-                            <p:childTnLst>
-                              <p:par>
-                                <p:cTn id="13" presetID="1" presetClass="entr" presetSubtype="0" fill="hold" nodeType="clickEffect">
-                                  <p:stCondLst>
-                                    <p:cond delay="0"/>
-                                  </p:stCondLst>
-                                  <p:childTnLst>
-                                    <p:set>
-                                      <p:cBhvr>
-                                        <p:cTn id="14" dur="1" fill="hold">
-                                          <p:stCondLst>
-                                            <p:cond delay="0"/>
-                                          </p:stCondLst>
-                                        </p:cTn>
-                                        <p:tgtEl>
-                                          <p:spTgt spid="15">
-                                            <p:txEl>
                                               <p:pRg st="3" end="3"/>
-                                            </p:txEl>
-                                          </p:spTgt>
-                                        </p:tgtEl>
-                                        <p:attrNameLst>
-                                          <p:attrName>style.visibility</p:attrName>
-                                        </p:attrNameLst>
-                                      </p:cBhvr>
-                                      <p:to>
-                                        <p:strVal val="visible"/>
-                                      </p:to>
-                                    </p:set>
-                                  </p:childTnLst>
-                                </p:cTn>
-                              </p:par>
-                            </p:childTnLst>
-                          </p:cTn>
-                        </p:par>
-                      </p:childTnLst>
-                    </p:cTn>
-                  </p:par>
-                  <p:par>
-                    <p:cTn id="15" fill="hold">
-                      <p:stCondLst>
-                        <p:cond delay="indefinite"/>
-                      </p:stCondLst>
-                      <p:childTnLst>
-                        <p:par>
-                          <p:cTn id="16" fill="hold">
-                            <p:stCondLst>
-                              <p:cond delay="0"/>
-                            </p:stCondLst>
-                            <p:childTnLst>
-                              <p:par>
-                                <p:cTn id="17" presetID="1" presetClass="entr" presetSubtype="0" fill="hold" nodeType="clickEffect">
-                                  <p:stCondLst>
-                                    <p:cond delay="0"/>
-                                  </p:stCondLst>
-                                  <p:childTnLst>
-                                    <p:set>
-                                      <p:cBhvr>
-                                        <p:cTn id="18" dur="1" fill="hold">
-                                          <p:stCondLst>
-                                            <p:cond delay="0"/>
-                                          </p:stCondLst>
-                                        </p:cTn>
-                                        <p:tgtEl>
-                                          <p:spTgt spid="15">
-                                            <p:txEl>
-                                              <p:pRg st="4" end="4"/>
-                                            </p:txEl>
-                                          </p:spTgt>
-                                        </p:tgtEl>
-                                        <p:attrNameLst>
-                                          <p:attrName>style.visibility</p:attrName>
-                                        </p:attrNameLst>
-                                      </p:cBhvr>
-                                      <p:to>
-                                        <p:strVal val="visible"/>
-                                      </p:to>
-                                    </p:set>
-                                  </p:childTnLst>
-                                </p:cTn>
-                              </p:par>
-                            </p:childTnLst>
-                          </p:cTn>
-                        </p:par>
-                      </p:childTnLst>
-                    </p:cTn>
-                  </p:par>
-                  <p:par>
-                    <p:cTn id="19" fill="hold">
-                      <p:stCondLst>
-                        <p:cond delay="indefinite"/>
-                      </p:stCondLst>
-                      <p:childTnLst>
-                        <p:par>
-                          <p:cTn id="20" fill="hold">
-                            <p:stCondLst>
-                              <p:cond delay="0"/>
-                            </p:stCondLst>
-                            <p:childTnLst>
-                              <p:par>
-                                <p:cTn id="21" presetID="1" presetClass="entr" presetSubtype="0" fill="hold" nodeType="clickEffect">
-                                  <p:stCondLst>
-                                    <p:cond delay="0"/>
-                                  </p:stCondLst>
-                                  <p:childTnLst>
-                                    <p:set>
-                                      <p:cBhvr>
-                                        <p:cTn id="22" dur="1" fill="hold">
-                                          <p:stCondLst>
-                                            <p:cond delay="0"/>
-                                          </p:stCondLst>
-                                        </p:cTn>
-                                        <p:tgtEl>
-                                          <p:spTgt spid="15">
-                                            <p:txEl>
-                                              <p:pRg st="5" end="5"/>
                                             </p:txEl>
                                           </p:spTgt>
                                         </p:tgtEl>
@@ -38753,13 +38700,22 @@
               </a:buClr>
             </a:pPr>
             <a:r>
+              <a:rPr lang="bg-BG" sz="3400" b="1" dirty="0">
+                <a:solidFill>
+                  <a:schemeClr val="bg1"/>
+                </a:solidFill>
+                <a:cs typeface="Calibri"/>
+              </a:rPr>
+              <a:t>Структура</a:t>
+            </a:r>
+            <a:r>
               <a:rPr lang="en-US" sz="3400" b="1" dirty="0">
                 <a:solidFill>
                   <a:schemeClr val="bg1"/>
                 </a:solidFill>
                 <a:cs typeface="Calibri"/>
               </a:rPr>
-              <a:t>Стуктурата от данни</a:t>
+              <a:t> от данни</a:t>
             </a:r>
             <a:r>
               <a:rPr lang="en-US" sz="3400" dirty="0">
@@ -38768,7 +38724,7 @@
                 </a:solidFill>
                 <a:cs typeface="Calibri"/>
               </a:rPr>
-              <a:t> представя данни изобразени в компютърната памет, коят</a:t>
+              <a:t> </a:t>
             </a:r>
             <a:r>
               <a:rPr lang="bg-BG" sz="3400" dirty="0">
@@ -38777,7 +38733,7 @@
                 </a:solidFill>
                 <a:cs typeface="Calibri"/>
               </a:rPr>
-              <a:t>о</a:t>
+              <a:t>==</a:t>
             </a:r>
             <a:r>
               <a:rPr lang="en-US" sz="3400" dirty="0">
@@ -38786,9 +38742,54 @@
                 </a:solidFill>
                 <a:cs typeface="Calibri"/>
               </a:rPr>
-              <a:t> позволява ефективен достъп и модификация</a:t>
-            </a:r>
-            <a:endParaRPr lang="bg-BG" sz="3400" dirty="0">
+              <a:t> </a:t>
+            </a:r>
+            <a:r>
+              <a:rPr lang="bg-BG" sz="3400" dirty="0">
+                <a:solidFill>
+                  <a:srgbClr val="234465"/>
+                </a:solidFill>
+                <a:cs typeface="Calibri"/>
+              </a:rPr>
+              <a:t>начин на организация на данните, който</a:t>
+            </a:r>
+            <a:r>
+              <a:rPr lang="en-US" sz="3400" dirty="0">
+                <a:solidFill>
+                  <a:srgbClr val="234465"/>
+                </a:solidFill>
+                <a:cs typeface="Calibri"/>
+              </a:rPr>
+              <a:t> позволява </a:t>
+            </a:r>
+            <a:r>
+              <a:rPr lang="en-US" sz="3400" b="1" dirty="0">
+                <a:solidFill>
+                  <a:srgbClr val="234465"/>
+                </a:solidFill>
+                <a:cs typeface="Calibri"/>
+              </a:rPr>
+              <a:t>ефективен достъп </a:t>
+            </a:r>
+            <a:r>
+              <a:rPr lang="en-US" sz="3400" dirty="0">
+                <a:solidFill>
+                  <a:srgbClr val="234465"/>
+                </a:solidFill>
+                <a:cs typeface="Calibri"/>
+              </a:rPr>
+              <a:t>и </a:t>
+            </a:r>
+            <a:r>
+              <a:rPr lang="en-US" sz="3400" b="1" dirty="0">
+                <a:solidFill>
+                  <a:srgbClr val="234465"/>
+                </a:solidFill>
+                <a:cs typeface="Calibri"/>
+              </a:rPr>
+              <a:t>модификация</a:t>
+            </a:r>
+            <a:endParaRPr lang="bg-BG" sz="3400" b="1" dirty="0">
               <a:solidFill>
                 <a:srgbClr val="234465"/>
               </a:solidFill>
@@ -39101,7 +39102,7 @@
                                         <p:tgtEl>
                                           <p:spTgt spid="3">
                                             <p:txEl>
-                                              <p:pRg st="0" end="0"/>
+                                              <p:pRg st="1" end="1"/>
                                             </p:txEl>
                                           </p:spTgt>
                                         </p:tgtEl>
@@ -39150,7 +39151,7 @@
                                         <p:tgtEl>
                                           <p:spTgt spid="3">
                                             <p:txEl>
-                                              <p:pRg st="1" end="1"/>
+                                              <p:pRg st="2" end="2"/>
                                             </p:txEl>
                                           </p:spTgt>
                                         </p:tgtEl>
@@ -39199,7 +39200,7 @@
                                         <p:tgtEl>
                                           <p:spTgt spid="3">
                                             <p:txEl>
-                                              <p:pRg st="2" end="2"/>
+                                              <p:pRg st="3" end="3"/>
                                             </p:txEl>
                                           </p:spTgt>
                                         </p:tgtEl>
@@ -39248,7 +39249,7 @@
                                         <p:tgtEl>
                                           <p:spTgt spid="3">
                                             <p:txEl>
-                                              <p:pRg st="3" end="3"/>
+                                              <p:pRg st="4" end="4"/>
                                             </p:txEl>
                                           </p:spTgt>
                                         </p:tgtEl>
@@ -39290,55 +39291,6 @@
                                     <p:set>
                                       <p:cBhvr>
                                         <p:cTn id="22" dur="1" fill="hold">
-                                          <p:stCondLst>
-                                            <p:cond delay="0"/>
-                                          </p:stCondLst>
-                                        </p:cTn>
-                                        <p:tgtEl>
-                                          <p:spTgt spid="3">
-                                            <p:txEl>
-                                              <p:pRg st="4" end="4"/>
-                                            </p:txEl>
-                                          </p:spTgt>
-                                        </p:tgtEl>
-                                        <p:attrNameLst>
-                                          <p:attrName>style.visibility</p:attrName>
-                                        </p:attrNameLst>
-                                      </p:cBhvr>
-                                      <p:to>
-                                        <p:strVal val="visible"/>
-                                      </p:to>
-                                    </p:set>
-                                  </p:childTnLst>
-                                </p:cTn>
-                              </p:par>
-                            </p:childTnLst>
-                          </p:cTn>
-                        </p:par>
-                      </p:childTnLst>
-                    </p:cTn>
-                  </p:par>
-                  <p:par>
-                    <p:cTn id="23" fill="hold">
-                      <p:stCondLst>
-                        <p:cond delay="indefinite"/>
-                      </p:stCondLst>
-                      <p:childTnLst>
-                        <p:par>
-                          <p:cTn id="24" fill="hold">
-                            <p:stCondLst>
-                              <p:cond delay="0"/>
-                            </p:stCondLst>
-                            <p:childTnLst>
-                              <p:par>
-                                <p:cTn id="25" presetID="1" presetClass="entr" presetSubtype="0" fill="hold" nodeType="clickEffect">
-                                  <p:stCondLst>
-                                    <p:cond delay="0"/>
-                                  </p:stCondLst>
-                                  <p:childTnLst>
-                                    <p:set>
-                                      <p:cBhvr>
-                                        <p:cTn id="26" dur="1" fill="hold">
                                           <p:stCondLst>
                                             <p:cond delay="0"/>
                                           </p:stCondLst>
@@ -39437,7 +39389,7 @@
                   <a:schemeClr val="bg1"/>
                 </a:solidFill>
               </a:rPr>
-              <a:t>Структурата от данни</a:t>
+              <a:t>Структурите от данни</a:t>
             </a:r>
             <a:r>
               <a:rPr lang="en-US" b="1" dirty="0">
@@ -39449,7 +39401,7 @@
             </a:r>
             <a:r>
               <a:rPr lang="bg-BG" dirty="0"/>
-              <a:t>и алогоритмите са основата на програмирането</a:t>
+              <a:t>и алгоритмите стоят в основата на програмирането</a:t>
             </a:r>
           </a:p>
           <a:p>
@@ -39733,20 +39685,8 @@
               <a:t>+ </a:t>
             </a:r>
             <a:r>
-              <a:rPr lang="en-US" sz="3350" b="1" dirty="0"/>
-              <a:t>структ</a:t>
-            </a:r>
-            <a:r>
               <a:rPr lang="bg-BG" sz="3350" b="1" dirty="0"/>
-              <a:t>ъ</a:t>
-            </a:r>
-            <a:r>
-              <a:rPr lang="en-US" sz="3350" b="1" dirty="0"/>
-              <a:t>р</a:t>
-            </a:r>
-            <a:r>
-              <a:rPr lang="bg-BG" sz="3350" b="1" dirty="0"/>
-              <a:t>и</a:t>
+              <a:t>структури</a:t>
             </a:r>
             <a:r>
               <a:rPr lang="en-US" sz="3350" b="1" dirty="0"/>
@@ -39775,13 +39715,13 @@
         <p:spPr/>
         <p:txBody>
           <a:bodyPr>
-            <a:normAutofit fontScale="90000"/>
+            <a:normAutofit/>
           </a:bodyPr>
           <a:lstStyle/>
           <a:p>
             <a:r>
               <a:rPr lang="en-US" sz="3950" dirty="0"/>
-              <a:t>Защо стуктурите от данни са толкова важни?</a:t>
+              <a:t>Защо стуктурите от данни са важни?</a:t>
             </a:r>
           </a:p>
         </p:txBody>
@@ -40150,11 +40090,47 @@
                   <a:schemeClr val="bg1"/>
                 </a:solidFill>
               </a:rPr>
-              <a:t> данни</a:t>
+              <a:t> </a:t>
+            </a:r>
+            <a:r>
+              <a:rPr lang="bg-BG" sz="3400" b="1" dirty="0">
+                <a:solidFill>
+                  <a:schemeClr val="bg1"/>
+                </a:solidFill>
+              </a:rPr>
+              <a:t>структури от </a:t>
+            </a:r>
+            <a:r>
+              <a:rPr lang="en-US" sz="3400" b="1" dirty="0">
+                <a:solidFill>
+                  <a:schemeClr val="bg1"/>
+                </a:solidFill>
+              </a:rPr>
+              <a:t>данни</a:t>
             </a:r>
             <a:r>
               <a:rPr lang="en-US" sz="3400" dirty="0"/>
-              <a:t>: масив, списъци, стекове, опашки</a:t>
+              <a:t>: масив, </a:t>
+            </a:r>
+            <a:r>
+              <a:rPr lang="bg-BG" sz="3400" dirty="0"/>
+              <a:t>списък</a:t>
+            </a:r>
+            <a:r>
+              <a:rPr lang="en-US" sz="3400" dirty="0"/>
+              <a:t>, </a:t>
+            </a:r>
+            <a:r>
+              <a:rPr lang="bg-BG" sz="3400" dirty="0"/>
+              <a:t>стек</a:t>
+            </a:r>
+            <a:r>
+              <a:rPr lang="en-US" sz="3400" dirty="0"/>
+              <a:t>, </a:t>
+            </a:r>
+            <a:r>
+              <a:rPr lang="bg-BG" sz="3400" dirty="0"/>
+              <a:t>опашка</a:t>
             </a:r>
             <a:endParaRPr lang="en-US" sz="3400" dirty="0">
               <a:cs typeface="Calibri"/>
@@ -40191,7 +40167,7 @@
           <a:p>
             <a:r>
               <a:rPr lang="bg-BG" dirty="0"/>
-              <a:t>Линейни данни</a:t>
+              <a:t>Линейни структури от данни</a:t>
             </a:r>
             <a:endParaRPr lang="en-BG" dirty="0"/>
           </a:p>
@@ -41478,7 +41454,23 @@
                   <a:schemeClr val="bg1"/>
                 </a:solidFill>
               </a:rPr>
-              <a:t>Списък от числа</a:t>
+              <a:t>Списък </a:t>
+            </a:r>
+            <a:r>
+              <a:rPr lang="bg-BG" sz="3400" b="1" dirty="0">
+                <a:solidFill>
+                  <a:schemeClr val="bg1"/>
+                </a:solidFill>
+              </a:rPr>
+              <a:t>с</a:t>
+            </a:r>
+            <a:r>
+              <a:rPr lang="en-US" sz="3400" b="1" dirty="0">
+                <a:solidFill>
+                  <a:schemeClr val="bg1"/>
+                </a:solidFill>
+              </a:rPr>
+              <a:t> числа</a:t>
             </a:r>
             <a:r>
               <a:rPr lang="en-US" sz="3400" dirty="0"/>
@@ -41640,7 +41632,27 @@
                 <a:ea typeface="+mj-lt"/>
                 <a:cs typeface="+mj-lt"/>
               </a:rPr>
-              <a:t>Списък от числа</a:t>
+              <a:t>Списък </a:t>
+            </a:r>
+            <a:r>
+              <a:rPr lang="bg-BG" sz="3950" dirty="0">
+                <a:solidFill>
+                  <a:srgbClr val="FFFFFF"/>
+                </a:solidFill>
+                <a:ea typeface="+mj-lt"/>
+                <a:cs typeface="+mj-lt"/>
+              </a:rPr>
+              <a:t>с</a:t>
+            </a:r>
+            <a:r>
+              <a:rPr lang="en-US" sz="3950" dirty="0">
+                <a:solidFill>
+                  <a:srgbClr val="FFFFFF"/>
+                </a:solidFill>
+                <a:ea typeface="+mj-lt"/>
+                <a:cs typeface="+mj-lt"/>
+              </a:rPr>
+              <a:t> числа</a:t>
             </a:r>
             <a:r>
               <a:rPr lang="en-US" sz="3950" dirty="0"/>
@@ -44122,8 +44134,12 @@
           <a:lstStyle/>
           <a:p>
             <a:r>
-              <a:rPr lang="en-GB" dirty="0"/>
-              <a:t>Общ преглед и работа със стек</a:t>
+              <a:rPr lang="bg-BG" dirty="0"/>
+              <a:t>Стек (</a:t>
+            </a:r>
+            <a:r>
+              <a:rPr lang="en-US" dirty="0"/>
+              <a:t>Stack)</a:t>
             </a:r>
             <a:endParaRPr lang="bg-BG" dirty="0"/>
           </a:p>
@@ -44190,19 +44206,16 @@
               </a:buClr>
             </a:pPr>
             <a:r>
-              <a:rPr lang="en-US" sz="3400" b="1" dirty="0">
+              <a:rPr lang="bg-BG" sz="3400" b="1" dirty="0">
                 <a:solidFill>
                   <a:schemeClr val="bg1"/>
                 </a:solidFill>
                 <a:cs typeface="Consolas" panose="020B0609020204030204" pitchFamily="49" charset="0"/>
               </a:rPr>
-              <a:t>Стек </a:t>
-            </a:r>
-            <a:r>
-              <a:rPr lang="en-US" sz="3400" dirty="0">
-                <a:solidFill>
-                  <a:srgbClr val="234465"/>
-                </a:solidFill>
+              <a:t>Стекът </a:t>
+            </a:r>
+            <a:r>
+              <a:rPr lang="bg-BG" sz="3400" dirty="0">
                 <a:cs typeface="Consolas" panose="020B0609020204030204" pitchFamily="49" charset="0"/>
               </a:rPr>
               <a:t>предоставя</a:t>
@@ -46760,6 +46773,9 @@
                     <p:cTn id="3" fill="hold">
                       <p:stCondLst>
                         <p:cond delay="indefinite"/>
+                        <p:cond evt="onBegin" delay="0">
+                          <p:tn val="2"/>
+                        </p:cond>
                       </p:stCondLst>
                       <p:childTnLst>
                         <p:par>
@@ -46769,7 +46785,7 @@
                             </p:stCondLst>
                             <p:childTnLst>
                               <p:par>
-                                <p:cTn id="5" presetID="1" presetClass="entr" presetSubtype="0" fill="hold" nodeType="clickEffect">
+                                <p:cTn id="5" presetID="1" presetClass="entr" presetSubtype="0" fill="hold" nodeType="withEffect">
                                   <p:stCondLst>
                                     <p:cond delay="0"/>
                                   </p:stCondLst>
@@ -46777,37 +46793,6 @@
                                     <p:set>
                                       <p:cBhvr>
                                         <p:cTn id="6" dur="1" fill="hold">
-                                          <p:stCondLst>
-                                            <p:cond delay="0"/>
-                                          </p:stCondLst>
-                                        </p:cTn>
-                                        <p:tgtEl>
-                                          <p:spTgt spid="428035">
-                                            <p:txEl>
-                                              <p:pRg st="1" end="1"/>
-                                            </p:txEl>
-                                          </p:spTgt>
-                                        </p:tgtEl>
-                                        <p:attrNameLst>
-                                          <p:attrName>style.visibility</p:attrName>
-                                        </p:attrNameLst>
-                                      </p:cBhvr>
-                                      <p:to>
-                                        <p:strVal val="visible"/>
-                                      </p:to>
-                                    </p:set>
-                                  </p:childTnLst>
-                                </p:cTn>
-                              </p:par>
-                              <p:par>
-                                <p:cTn id="7" presetID="1" presetClass="entr" presetSubtype="0" fill="hold" nodeType="withEffect">
-                                  <p:stCondLst>
-                                    <p:cond delay="0"/>
-                                  </p:stCondLst>
-                                  <p:childTnLst>
-                                    <p:set>
-                                      <p:cBhvr>
-                                        <p:cTn id="8" dur="1" fill="hold">
                                           <p:stCondLst>
                                             <p:cond delay="0"/>
                                           </p:stCondLst>
@@ -46833,26 +46818,26 @@
                     </p:cTn>
                   </p:par>
                   <p:par>
-                    <p:cTn id="9" fill="hold">
+                    <p:cTn id="7" fill="hold">
                       <p:stCondLst>
                         <p:cond delay="indefinite"/>
                       </p:stCondLst>
                       <p:childTnLst>
                         <p:par>
-                          <p:cTn id="10" fill="hold">
+                          <p:cTn id="8" fill="hold">
                             <p:stCondLst>
                               <p:cond delay="0"/>
                             </p:stCondLst>
                             <p:childTnLst>
                               <p:par>
-                                <p:cTn id="11" presetID="1" presetClass="entr" presetSubtype="0" fill="hold" nodeType="clickEffect">
+                                <p:cTn id="9" presetID="1" presetClass="entr" presetSubtype="0" fill="hold" nodeType="clickEffect">
                                   <p:stCondLst>
                                     <p:cond delay="0"/>
                                   </p:stCondLst>
                                   <p:childTnLst>
                                     <p:set>
                                       <p:cBhvr>
-                                        <p:cTn id="12" dur="1" fill="hold">
+                                        <p:cTn id="10" dur="1" fill="hold">
                                           <p:stCondLst>
                                             <p:cond delay="0"/>
                                           </p:stCondLst>
@@ -46876,14 +46861,14 @@
                                 </p:cTn>
                               </p:par>
                               <p:par>
-                                <p:cTn id="13" presetID="1" presetClass="entr" presetSubtype="0" fill="hold" nodeType="withEffect">
+                                <p:cTn id="11" presetID="1" presetClass="entr" presetSubtype="0" fill="hold" nodeType="withEffect">
                                   <p:stCondLst>
                                     <p:cond delay="0"/>
                                   </p:stCondLst>
                                   <p:childTnLst>
                                     <p:set>
                                       <p:cBhvr>
-                                        <p:cTn id="14" dur="1" fill="hold">
+                                        <p:cTn id="12" dur="1" fill="hold">
                                           <p:stCondLst>
                                             <p:cond delay="0"/>
                                           </p:stCondLst>
@@ -46909,26 +46894,26 @@
                     </p:cTn>
                   </p:par>
                   <p:par>
-                    <p:cTn id="15" fill="hold">
+                    <p:cTn id="13" fill="hold">
                       <p:stCondLst>
                         <p:cond delay="indefinite"/>
                       </p:stCondLst>
                       <p:childTnLst>
                         <p:par>
-                          <p:cTn id="16" fill="hold">
+                          <p:cTn id="14" fill="hold">
                             <p:stCondLst>
                               <p:cond delay="0"/>
                             </p:stCondLst>
                             <p:childTnLst>
                               <p:par>
-                                <p:cTn id="17" presetID="1" presetClass="entr" presetSubtype="0" fill="hold" nodeType="clickEffect">
+                                <p:cTn id="15" presetID="1" presetClass="entr" presetSubtype="0" fill="hold" nodeType="clickEffect">
                                   <p:stCondLst>
                                     <p:cond delay="0"/>
                                   </p:stCondLst>
                                   <p:childTnLst>
                                     <p:set>
                                       <p:cBhvr>
-                                        <p:cTn id="18" dur="1" fill="hold">
+                                        <p:cTn id="16" dur="1" fill="hold">
                                           <p:stCondLst>
                                             <p:cond delay="0"/>
                                           </p:stCondLst>
@@ -46952,14 +46937,14 @@
                                 </p:cTn>
                               </p:par>
                               <p:par>
-                                <p:cTn id="19" presetID="1" presetClass="entr" presetSubtype="0" fill="hold" nodeType="withEffect">
+                                <p:cTn id="17" presetID="1" presetClass="entr" presetSubtype="0" fill="hold" nodeType="withEffect">
                                   <p:stCondLst>
                                     <p:cond delay="0"/>
                                   </p:stCondLst>
                                   <p:childTnLst>
                                     <p:set>
                                       <p:cBhvr>
-                                        <p:cTn id="20" dur="1" fill="hold">
+                                        <p:cTn id="18" dur="1" fill="hold">
                                           <p:stCondLst>
                                             <p:cond delay="0"/>
                                           </p:stCondLst>

</xml_diff>

<commit_message>
Moved task from advance to basic level
</commit_message>
<xml_diff>
--- a/Courses/Software-Sciences/Module-2-DS-and-Algo/03.1-Stack-and-Queue-Basics/03.1-Stack-and-Queue-Basics.pptx
+++ b/Courses/Software-Sciences/Module-2-DS-and-Algo/03.1-Stack-and-Queue-Basics/03.1-Stack-and-Queue-Basics.pptx
@@ -331,7 +331,7 @@
           <a:p>
             <a:fld id="{4E087215-0C8F-4762-A664-737A353EC9A4}" type="datetimeFigureOut">
               <a:rPr lang="bg-BG" smtClean="0"/>
-              <a:t>18.08.23 г.</a:t>
+              <a:t>19.8.2023 г.</a:t>
             </a:fld>
             <a:endParaRPr lang="bg-BG" dirty="0"/>
           </a:p>
@@ -522,7 +522,7 @@
           <a:p>
             <a:fld id="{72D84649-876A-46C9-8472-14CB09C070D8}" type="datetimeFigureOut">
               <a:rPr lang="en-US" smtClean="0"/>
-              <a:t>8/18/23</a:t>
+              <a:t>8/19/2023</a:t>
             </a:fld>
             <a:endParaRPr lang="en-US" dirty="0"/>
           </a:p>
@@ -36983,83 +36983,24 @@
                 <a:ea typeface="+mn-lt"/>
                 <a:cs typeface="+mn-lt"/>
               </a:rPr>
-              <a:t> в Judge: </a:t>
-            </a:r>
-            <a:r>
-              <a:rPr lang="en-US" sz="1750" u="sng" dirty="0">
+              <a:t> в Judge</a:t>
+            </a:r>
+            <a:r>
+              <a:rPr lang="en-US" sz="1750">
+                <a:ea typeface="+mn-lt"/>
+                <a:cs typeface="+mn-lt"/>
+              </a:rPr>
+              <a:t>: </a:t>
+            </a:r>
+            <a:r>
+              <a:rPr lang="en-US" sz="1750" u="sng">
                 <a:hlinkClick r:id="rId2"/>
               </a:rPr>
-              <a:t>https://judge.softuni.org/Contests/Practice/Index/3174#7</a:t>
+              <a:t>https://judge.softuni.org/Contests/Practice/Index/4153#0</a:t>
             </a:r>
             <a:endParaRPr lang="en-US" sz="1750" dirty="0">
               <a:cs typeface="Calibri"/>
             </a:endParaRPr>
-          </a:p>
-        </p:txBody>
-      </p:sp>
-      <p:sp>
-        <p:nvSpPr>
-          <p:cNvPr id="2" name="TextBox 1">
-            <a:extLst>
-              <a:ext uri="{FF2B5EF4-FFF2-40B4-BE49-F238E27FC236}">
-                <a16:creationId xmlns:a16="http://schemas.microsoft.com/office/drawing/2014/main" id="{65B90CC7-EB9A-C30C-E92A-A192B0E27F1E}"/>
-              </a:ext>
-            </a:extLst>
-          </p:cNvPr>
-          <p:cNvSpPr txBox="1"/>
-          <p:nvPr/>
-        </p:nvSpPr>
-        <p:spPr>
-          <a:xfrm>
-            <a:off x="7041000" y="1944000"/>
-            <a:ext cx="4494444" cy="861362"/>
-          </a:xfrm>
-          <a:prstGeom prst="rect">
-            <a:avLst/>
-          </a:prstGeom>
-          <a:ln/>
-        </p:spPr>
-        <p:style>
-          <a:lnRef idx="2">
-            <a:schemeClr val="accent2"/>
-          </a:lnRef>
-          <a:fillRef idx="1">
-            <a:schemeClr val="lt1"/>
-          </a:fillRef>
-          <a:effectRef idx="0">
-            <a:schemeClr val="accent2"/>
-          </a:effectRef>
-          <a:fontRef idx="minor">
-            <a:schemeClr val="dk1"/>
-          </a:fontRef>
-        </p:style>
-        <p:txBody>
-          <a:bodyPr vert="horz" wrap="square" lIns="144000" tIns="108000" rIns="144000" bIns="108000" rtlCol="0">
-            <a:spAutoFit/>
-          </a:bodyPr>
-          <a:lstStyle/>
-          <a:p>
-            <a:pPr algn="l" eaLnBrk="0" hangingPunct="0">
-              <a:lnSpc>
-                <a:spcPct val="110000"/>
-              </a:lnSpc>
-              <a:buClr>
-                <a:schemeClr val="accent5">
-                  <a:lumMod val="40000"/>
-                  <a:lumOff val="60000"/>
-                </a:schemeClr>
-              </a:buClr>
-              <a:buSzPct val="70000"/>
-            </a:pPr>
-            <a:r>
-              <a:rPr lang="bg-BG" sz="4000" dirty="0" err="1"/>
-              <a:t>T</a:t>
-            </a:r>
-            <a:r>
-              <a:rPr lang="en-US" sz="4000" dirty="0"/>
-              <a:t>ODO: Fix Judge link</a:t>
-            </a:r>
-            <a:endParaRPr lang="en-BG" sz="4000" dirty="0"/>
           </a:p>
         </p:txBody>
       </p:sp>

</xml_diff>